<commit_message>
changed presentation and doc and code little bit
</commit_message>
<xml_diff>
--- a/project/LogisticRegression.pptx
+++ b/project/LogisticRegression.pptx
@@ -2,18 +2,25 @@
 <file path=ppt/presentation.xml><?xml version="1.0" encoding="utf-8"?>
 <p:presentation xmlns:a="http://schemas.openxmlformats.org/drawingml/2006/main" xmlns:r="http://schemas.openxmlformats.org/officeDocument/2006/relationships" xmlns:p="http://schemas.openxmlformats.org/presentationml/2006/main" saveSubsetFonts="1" autoCompressPictures="0">
   <p:sldMasterIdLst>
-    <p:sldMasterId id="2147484062" r:id="rId1"/>
+    <p:sldMasterId id="2147484864" r:id="rId1"/>
   </p:sldMasterIdLst>
+  <p:notesMasterIdLst>
+    <p:notesMasterId r:id="rId13"/>
+  </p:notesMasterIdLst>
   <p:sldIdLst>
     <p:sldId id="256" r:id="rId2"/>
-    <p:sldId id="257" r:id="rId3"/>
-    <p:sldId id="261" r:id="rId4"/>
-    <p:sldId id="258" r:id="rId5"/>
-    <p:sldId id="260" r:id="rId6"/>
-    <p:sldId id="259" r:id="rId7"/>
-    <p:sldId id="262" r:id="rId8"/>
+    <p:sldId id="266" r:id="rId3"/>
+    <p:sldId id="257" r:id="rId4"/>
+    <p:sldId id="261" r:id="rId5"/>
+    <p:sldId id="258" r:id="rId6"/>
+    <p:sldId id="260" r:id="rId7"/>
+    <p:sldId id="259" r:id="rId8"/>
+    <p:sldId id="264" r:id="rId9"/>
+    <p:sldId id="265" r:id="rId10"/>
+    <p:sldId id="262" r:id="rId11"/>
+    <p:sldId id="263" r:id="rId12"/>
   </p:sldIdLst>
-  <p:sldSz cx="12192000" cy="6858000"/>
+  <p:sldSz cx="9144000" cy="6858000" type="screen4x3"/>
   <p:notesSz cx="6858000" cy="9144000"/>
   <p:defaultTextStyle>
     <a:defPPr>
@@ -110,7 +117,451 @@
       </a:defRPr>
     </a:lvl9pPr>
   </p:defaultTextStyle>
+  <p:extLst>
+    <p:ext uri="{EFAFB233-063F-42B5-8137-9DF3F51BA10A}">
+      <p15:sldGuideLst xmlns:p15="http://schemas.microsoft.com/office/powerpoint/2012/main"/>
+    </p:ext>
+  </p:extLst>
 </p:presentation>
+</file>
+
+<file path=ppt/notesMasters/notesMaster1.xml><?xml version="1.0" encoding="utf-8"?>
+<p:notesMaster xmlns:a="http://schemas.openxmlformats.org/drawingml/2006/main" xmlns:r="http://schemas.openxmlformats.org/officeDocument/2006/relationships" xmlns:p="http://schemas.openxmlformats.org/presentationml/2006/main">
+  <p:cSld>
+    <p:bg>
+      <p:bgRef idx="1001">
+        <a:schemeClr val="bg1"/>
+      </p:bgRef>
+    </p:bg>
+    <p:spTree>
+      <p:nvGrpSpPr>
+        <p:cNvPr id="1" name=""/>
+        <p:cNvGrpSpPr/>
+        <p:nvPr/>
+      </p:nvGrpSpPr>
+      <p:grpSpPr>
+        <a:xfrm>
+          <a:off x="0" y="0"/>
+          <a:ext cx="0" cy="0"/>
+          <a:chOff x="0" y="0"/>
+          <a:chExt cx="0" cy="0"/>
+        </a:xfrm>
+      </p:grpSpPr>
+      <p:sp>
+        <p:nvSpPr>
+          <p:cNvPr id="2" name="Header Placeholder 1"/>
+          <p:cNvSpPr>
+            <a:spLocks noGrp="1"/>
+          </p:cNvSpPr>
+          <p:nvPr>
+            <p:ph type="hdr" sz="quarter"/>
+          </p:nvPr>
+        </p:nvSpPr>
+        <p:spPr>
+          <a:xfrm>
+            <a:off x="0" y="0"/>
+            <a:ext cx="2971800" cy="458788"/>
+          </a:xfrm>
+          <a:prstGeom prst="rect">
+            <a:avLst/>
+          </a:prstGeom>
+        </p:spPr>
+        <p:txBody>
+          <a:bodyPr vert="horz" lIns="91440" tIns="45720" rIns="91440" bIns="45720" rtlCol="0"/>
+          <a:lstStyle>
+            <a:lvl1pPr algn="l">
+              <a:defRPr sz="1200"/>
+            </a:lvl1pPr>
+          </a:lstStyle>
+          <a:p>
+            <a:endParaRPr lang="en-US"/>
+          </a:p>
+        </p:txBody>
+      </p:sp>
+      <p:sp>
+        <p:nvSpPr>
+          <p:cNvPr id="3" name="Date Placeholder 2"/>
+          <p:cNvSpPr>
+            <a:spLocks noGrp="1"/>
+          </p:cNvSpPr>
+          <p:nvPr>
+            <p:ph type="dt" idx="1"/>
+          </p:nvPr>
+        </p:nvSpPr>
+        <p:spPr>
+          <a:xfrm>
+            <a:off x="3884613" y="0"/>
+            <a:ext cx="2971800" cy="458788"/>
+          </a:xfrm>
+          <a:prstGeom prst="rect">
+            <a:avLst/>
+          </a:prstGeom>
+        </p:spPr>
+        <p:txBody>
+          <a:bodyPr vert="horz" lIns="91440" tIns="45720" rIns="91440" bIns="45720" rtlCol="0"/>
+          <a:lstStyle>
+            <a:lvl1pPr algn="r">
+              <a:defRPr sz="1200"/>
+            </a:lvl1pPr>
+          </a:lstStyle>
+          <a:p>
+            <a:fld id="{9BCC2436-D377-CC4F-BA5D-96C6CA6E2ED5}" type="datetimeFigureOut">
+              <a:rPr lang="en-US" smtClean="0"/>
+              <a:t>4/23/16</a:t>
+            </a:fld>
+            <a:endParaRPr lang="en-US"/>
+          </a:p>
+        </p:txBody>
+      </p:sp>
+      <p:sp>
+        <p:nvSpPr>
+          <p:cNvPr id="4" name="Slide Image Placeholder 3"/>
+          <p:cNvSpPr>
+            <a:spLocks noGrp="1" noRot="1" noChangeAspect="1"/>
+          </p:cNvSpPr>
+          <p:nvPr>
+            <p:ph type="sldImg" idx="2"/>
+          </p:nvPr>
+        </p:nvSpPr>
+        <p:spPr>
+          <a:xfrm>
+            <a:off x="1371600" y="1143000"/>
+            <a:ext cx="4114800" cy="3086100"/>
+          </a:xfrm>
+          <a:prstGeom prst="rect">
+            <a:avLst/>
+          </a:prstGeom>
+          <a:noFill/>
+          <a:ln w="12700">
+            <a:solidFill>
+              <a:prstClr val="black"/>
+            </a:solidFill>
+          </a:ln>
+        </p:spPr>
+        <p:txBody>
+          <a:bodyPr vert="horz" lIns="91440" tIns="45720" rIns="91440" bIns="45720" rtlCol="0" anchor="ctr"/>
+          <a:lstStyle/>
+          <a:p>
+            <a:endParaRPr lang="en-US"/>
+          </a:p>
+        </p:txBody>
+      </p:sp>
+      <p:sp>
+        <p:nvSpPr>
+          <p:cNvPr id="5" name="Notes Placeholder 4"/>
+          <p:cNvSpPr>
+            <a:spLocks noGrp="1"/>
+          </p:cNvSpPr>
+          <p:nvPr>
+            <p:ph type="body" sz="quarter" idx="3"/>
+          </p:nvPr>
+        </p:nvSpPr>
+        <p:spPr>
+          <a:xfrm>
+            <a:off x="685800" y="4400550"/>
+            <a:ext cx="5486400" cy="3600450"/>
+          </a:xfrm>
+          <a:prstGeom prst="rect">
+            <a:avLst/>
+          </a:prstGeom>
+        </p:spPr>
+        <p:txBody>
+          <a:bodyPr vert="horz" lIns="91440" tIns="45720" rIns="91440" bIns="45720" rtlCol="0"/>
+          <a:lstStyle/>
+          <a:p>
+            <a:pPr lvl="0"/>
+            <a:r>
+              <a:rPr lang="en-US" smtClean="0"/>
+              <a:t>Click to edit Master text styles</a:t>
+            </a:r>
+          </a:p>
+          <a:p>
+            <a:pPr lvl="1"/>
+            <a:r>
+              <a:rPr lang="en-US" smtClean="0"/>
+              <a:t>Second level</a:t>
+            </a:r>
+          </a:p>
+          <a:p>
+            <a:pPr lvl="2"/>
+            <a:r>
+              <a:rPr lang="en-US" smtClean="0"/>
+              <a:t>Third level</a:t>
+            </a:r>
+          </a:p>
+          <a:p>
+            <a:pPr lvl="3"/>
+            <a:r>
+              <a:rPr lang="en-US" smtClean="0"/>
+              <a:t>Fourth level</a:t>
+            </a:r>
+          </a:p>
+          <a:p>
+            <a:pPr lvl="4"/>
+            <a:r>
+              <a:rPr lang="en-US" smtClean="0"/>
+              <a:t>Fifth level</a:t>
+            </a:r>
+            <a:endParaRPr lang="en-US"/>
+          </a:p>
+        </p:txBody>
+      </p:sp>
+      <p:sp>
+        <p:nvSpPr>
+          <p:cNvPr id="6" name="Footer Placeholder 5"/>
+          <p:cNvSpPr>
+            <a:spLocks noGrp="1"/>
+          </p:cNvSpPr>
+          <p:nvPr>
+            <p:ph type="ftr" sz="quarter" idx="4"/>
+          </p:nvPr>
+        </p:nvSpPr>
+        <p:spPr>
+          <a:xfrm>
+            <a:off x="0" y="8685213"/>
+            <a:ext cx="2971800" cy="458787"/>
+          </a:xfrm>
+          <a:prstGeom prst="rect">
+            <a:avLst/>
+          </a:prstGeom>
+        </p:spPr>
+        <p:txBody>
+          <a:bodyPr vert="horz" lIns="91440" tIns="45720" rIns="91440" bIns="45720" rtlCol="0" anchor="b"/>
+          <a:lstStyle>
+            <a:lvl1pPr algn="l">
+              <a:defRPr sz="1200"/>
+            </a:lvl1pPr>
+          </a:lstStyle>
+          <a:p>
+            <a:endParaRPr lang="en-US"/>
+          </a:p>
+        </p:txBody>
+      </p:sp>
+      <p:sp>
+        <p:nvSpPr>
+          <p:cNvPr id="7" name="Slide Number Placeholder 6"/>
+          <p:cNvSpPr>
+            <a:spLocks noGrp="1"/>
+          </p:cNvSpPr>
+          <p:nvPr>
+            <p:ph type="sldNum" sz="quarter" idx="5"/>
+          </p:nvPr>
+        </p:nvSpPr>
+        <p:spPr>
+          <a:xfrm>
+            <a:off x="3884613" y="8685213"/>
+            <a:ext cx="2971800" cy="458787"/>
+          </a:xfrm>
+          <a:prstGeom prst="rect">
+            <a:avLst/>
+          </a:prstGeom>
+        </p:spPr>
+        <p:txBody>
+          <a:bodyPr vert="horz" lIns="91440" tIns="45720" rIns="91440" bIns="45720" rtlCol="0" anchor="b"/>
+          <a:lstStyle>
+            <a:lvl1pPr algn="r">
+              <a:defRPr sz="1200"/>
+            </a:lvl1pPr>
+          </a:lstStyle>
+          <a:p>
+            <a:fld id="{A4560D41-F940-4B41-A50E-C6D3FA78C987}" type="slidenum">
+              <a:rPr lang="en-US" smtClean="0"/>
+              <a:t>‹#›</a:t>
+            </a:fld>
+            <a:endParaRPr lang="en-US"/>
+          </a:p>
+        </p:txBody>
+      </p:sp>
+    </p:spTree>
+    <p:extLst>
+      <p:ext uri="{BB962C8B-B14F-4D97-AF65-F5344CB8AC3E}">
+        <p14:creationId xmlns:p14="http://schemas.microsoft.com/office/powerpoint/2010/main" val="66542968"/>
+      </p:ext>
+    </p:extLst>
+  </p:cSld>
+  <p:clrMap bg1="lt1" tx1="dk1" bg2="lt2" tx2="dk2" accent1="accent1" accent2="accent2" accent3="accent3" accent4="accent4" accent5="accent5" accent6="accent6" hlink="hlink" folHlink="folHlink"/>
+  <p:notesStyle>
+    <a:lvl1pPr marL="0" algn="l" defTabSz="914400" rtl="0" eaLnBrk="1" latinLnBrk="0" hangingPunct="1">
+      <a:defRPr sz="1200" kern="1200">
+        <a:solidFill>
+          <a:schemeClr val="tx1"/>
+        </a:solidFill>
+        <a:latin typeface="+mn-lt"/>
+        <a:ea typeface="+mn-ea"/>
+        <a:cs typeface="+mn-cs"/>
+      </a:defRPr>
+    </a:lvl1pPr>
+    <a:lvl2pPr marL="457200" algn="l" defTabSz="914400" rtl="0" eaLnBrk="1" latinLnBrk="0" hangingPunct="1">
+      <a:defRPr sz="1200" kern="1200">
+        <a:solidFill>
+          <a:schemeClr val="tx1"/>
+        </a:solidFill>
+        <a:latin typeface="+mn-lt"/>
+        <a:ea typeface="+mn-ea"/>
+        <a:cs typeface="+mn-cs"/>
+      </a:defRPr>
+    </a:lvl2pPr>
+    <a:lvl3pPr marL="914400" algn="l" defTabSz="914400" rtl="0" eaLnBrk="1" latinLnBrk="0" hangingPunct="1">
+      <a:defRPr sz="1200" kern="1200">
+        <a:solidFill>
+          <a:schemeClr val="tx1"/>
+        </a:solidFill>
+        <a:latin typeface="+mn-lt"/>
+        <a:ea typeface="+mn-ea"/>
+        <a:cs typeface="+mn-cs"/>
+      </a:defRPr>
+    </a:lvl3pPr>
+    <a:lvl4pPr marL="1371600" algn="l" defTabSz="914400" rtl="0" eaLnBrk="1" latinLnBrk="0" hangingPunct="1">
+      <a:defRPr sz="1200" kern="1200">
+        <a:solidFill>
+          <a:schemeClr val="tx1"/>
+        </a:solidFill>
+        <a:latin typeface="+mn-lt"/>
+        <a:ea typeface="+mn-ea"/>
+        <a:cs typeface="+mn-cs"/>
+      </a:defRPr>
+    </a:lvl4pPr>
+    <a:lvl5pPr marL="1828800" algn="l" defTabSz="914400" rtl="0" eaLnBrk="1" latinLnBrk="0" hangingPunct="1">
+      <a:defRPr sz="1200" kern="1200">
+        <a:solidFill>
+          <a:schemeClr val="tx1"/>
+        </a:solidFill>
+        <a:latin typeface="+mn-lt"/>
+        <a:ea typeface="+mn-ea"/>
+        <a:cs typeface="+mn-cs"/>
+      </a:defRPr>
+    </a:lvl5pPr>
+    <a:lvl6pPr marL="2286000" algn="l" defTabSz="914400" rtl="0" eaLnBrk="1" latinLnBrk="0" hangingPunct="1">
+      <a:defRPr sz="1200" kern="1200">
+        <a:solidFill>
+          <a:schemeClr val="tx1"/>
+        </a:solidFill>
+        <a:latin typeface="+mn-lt"/>
+        <a:ea typeface="+mn-ea"/>
+        <a:cs typeface="+mn-cs"/>
+      </a:defRPr>
+    </a:lvl6pPr>
+    <a:lvl7pPr marL="2743200" algn="l" defTabSz="914400" rtl="0" eaLnBrk="1" latinLnBrk="0" hangingPunct="1">
+      <a:defRPr sz="1200" kern="1200">
+        <a:solidFill>
+          <a:schemeClr val="tx1"/>
+        </a:solidFill>
+        <a:latin typeface="+mn-lt"/>
+        <a:ea typeface="+mn-ea"/>
+        <a:cs typeface="+mn-cs"/>
+      </a:defRPr>
+    </a:lvl7pPr>
+    <a:lvl8pPr marL="3200400" algn="l" defTabSz="914400" rtl="0" eaLnBrk="1" latinLnBrk="0" hangingPunct="1">
+      <a:defRPr sz="1200" kern="1200">
+        <a:solidFill>
+          <a:schemeClr val="tx1"/>
+        </a:solidFill>
+        <a:latin typeface="+mn-lt"/>
+        <a:ea typeface="+mn-ea"/>
+        <a:cs typeface="+mn-cs"/>
+      </a:defRPr>
+    </a:lvl8pPr>
+    <a:lvl9pPr marL="3657600" algn="l" defTabSz="914400" rtl="0" eaLnBrk="1" latinLnBrk="0" hangingPunct="1">
+      <a:defRPr sz="1200" kern="1200">
+        <a:solidFill>
+          <a:schemeClr val="tx1"/>
+        </a:solidFill>
+        <a:latin typeface="+mn-lt"/>
+        <a:ea typeface="+mn-ea"/>
+        <a:cs typeface="+mn-cs"/>
+      </a:defRPr>
+    </a:lvl9pPr>
+  </p:notesStyle>
+</p:notesMaster>
+</file>
+
+<file path=ppt/notesSlides/notesSlide1.xml><?xml version="1.0" encoding="utf-8"?>
+<p:notes xmlns:a="http://schemas.openxmlformats.org/drawingml/2006/main" xmlns:r="http://schemas.openxmlformats.org/officeDocument/2006/relationships" xmlns:p="http://schemas.openxmlformats.org/presentationml/2006/main">
+  <p:cSld>
+    <p:spTree>
+      <p:nvGrpSpPr>
+        <p:cNvPr id="1" name=""/>
+        <p:cNvGrpSpPr/>
+        <p:nvPr/>
+      </p:nvGrpSpPr>
+      <p:grpSpPr>
+        <a:xfrm>
+          <a:off x="0" y="0"/>
+          <a:ext cx="0" cy="0"/>
+          <a:chOff x="0" y="0"/>
+          <a:chExt cx="0" cy="0"/>
+        </a:xfrm>
+      </p:grpSpPr>
+      <p:sp>
+        <p:nvSpPr>
+          <p:cNvPr id="2" name="Slide Image Placeholder 1"/>
+          <p:cNvSpPr>
+            <a:spLocks noGrp="1" noRot="1" noChangeAspect="1"/>
+          </p:cNvSpPr>
+          <p:nvPr>
+            <p:ph type="sldImg"/>
+          </p:nvPr>
+        </p:nvSpPr>
+        <p:spPr>
+          <a:xfrm>
+            <a:off x="1371600" y="1143000"/>
+            <a:ext cx="4114800" cy="3086100"/>
+          </a:xfrm>
+        </p:spPr>
+      </p:sp>
+      <p:sp>
+        <p:nvSpPr>
+          <p:cNvPr id="3" name="Notes Placeholder 2"/>
+          <p:cNvSpPr>
+            <a:spLocks noGrp="1"/>
+          </p:cNvSpPr>
+          <p:nvPr>
+            <p:ph type="body" idx="1"/>
+          </p:nvPr>
+        </p:nvSpPr>
+        <p:spPr/>
+        <p:txBody>
+          <a:bodyPr/>
+          <a:lstStyle/>
+          <a:p>
+            <a:endParaRPr lang="en-US" dirty="0"/>
+          </a:p>
+        </p:txBody>
+      </p:sp>
+      <p:sp>
+        <p:nvSpPr>
+          <p:cNvPr id="4" name="Slide Number Placeholder 3"/>
+          <p:cNvSpPr>
+            <a:spLocks noGrp="1"/>
+          </p:cNvSpPr>
+          <p:nvPr>
+            <p:ph type="sldNum" sz="quarter" idx="10"/>
+          </p:nvPr>
+        </p:nvSpPr>
+        <p:spPr/>
+        <p:txBody>
+          <a:bodyPr/>
+          <a:lstStyle/>
+          <a:p>
+            <a:fld id="{A4560D41-F940-4B41-A50E-C6D3FA78C987}" type="slidenum">
+              <a:rPr lang="en-US" smtClean="0"/>
+              <a:t>7</a:t>
+            </a:fld>
+            <a:endParaRPr lang="en-US"/>
+          </a:p>
+        </p:txBody>
+      </p:sp>
+    </p:spTree>
+    <p:extLst>
+      <p:ext uri="{BB962C8B-B14F-4D97-AF65-F5344CB8AC3E}">
+        <p14:creationId xmlns:p14="http://schemas.microsoft.com/office/powerpoint/2010/main" val="1696166736"/>
+      </p:ext>
+    </p:extLst>
+  </p:cSld>
+  <p:clrMapOvr>
+    <a:masterClrMapping/>
+  </p:clrMapOvr>
+</p:notes>
 </file>
 
 <file path=ppt/slideLayouts/slideLayout1.xml><?xml version="1.0" encoding="utf-8"?>
@@ -132,7 +583,7 @@
       </p:grpSpPr>
       <p:pic>
         <p:nvPicPr>
-          <p:cNvPr id="7" name="Picture 6" descr="Droplets-HD-Title-R1d.png"/>
+          <p:cNvPr id="8" name="Picture 7" descr="Droplets-SD-Title-R1d.png"/>
           <p:cNvPicPr>
             <a:picLocks noChangeAspect="1"/>
           </p:cNvPicPr>
@@ -153,7 +604,7 @@
         <p:spPr>
           <a:xfrm>
             <a:off x="0" y="0"/>
-            <a:ext cx="12192000" cy="6858000"/>
+            <a:ext cx="9144000" cy="6858000"/>
           </a:xfrm>
           <a:prstGeom prst="rect">
             <a:avLst/>
@@ -172,8 +623,8 @@
         </p:nvSpPr>
         <p:spPr>
           <a:xfrm>
-            <a:off x="1751012" y="1300785"/>
-            <a:ext cx="8689976" cy="2509213"/>
+            <a:off x="1313259" y="1300786"/>
+            <a:ext cx="6517482" cy="2509213"/>
           </a:xfrm>
         </p:spPr>
         <p:txBody>
@@ -206,8 +657,8 @@
         </p:nvSpPr>
         <p:spPr>
           <a:xfrm>
-            <a:off x="1751012" y="3886200"/>
-            <a:ext cx="8689976" cy="1371599"/>
+            <a:off x="1313259" y="3886201"/>
+            <a:ext cx="6517482" cy="1371599"/>
           </a:xfrm>
         </p:spPr>
         <p:txBody>
@@ -284,7 +735,7 @@
           <a:p>
             <a:fld id="{DDA51639-B2D6-4652-B8C3-1B4C224A7BAF}" type="datetimeFigureOut">
               <a:rPr lang="en-US" smtClean="0"/>
-              <a:t>4/16/16</a:t>
+              <a:t>4/23/16</a:t>
             </a:fld>
             <a:endParaRPr lang="en-US" dirty="0"/>
           </a:p>
@@ -336,7 +787,7 @@
     </p:spTree>
     <p:extLst>
       <p:ext uri="{BB962C8B-B14F-4D97-AF65-F5344CB8AC3E}">
-        <p14:creationId xmlns:p14="http://schemas.microsoft.com/office/powerpoint/2010/main" val="182197687"/>
+        <p14:creationId xmlns:p14="http://schemas.microsoft.com/office/powerpoint/2010/main" val="2016714305"/>
       </p:ext>
     </p:extLst>
   </p:cSld>
@@ -370,7 +821,7 @@
       </p:grpSpPr>
       <p:pic>
         <p:nvPicPr>
-          <p:cNvPr id="10" name="Picture 9" descr="Droplets-HD-Content-R1d.png"/>
+          <p:cNvPr id="9" name="Picture 8" descr="Droplets-SD-Content-R1d.png"/>
           <p:cNvPicPr>
             <a:picLocks noChangeAspect="1"/>
           </p:cNvPicPr>
@@ -391,7 +842,7 @@
         <p:spPr>
           <a:xfrm>
             <a:off x="0" y="0"/>
-            <a:ext cx="12192000" cy="6858000"/>
+            <a:ext cx="9144000" cy="6858000"/>
           </a:xfrm>
           <a:prstGeom prst="rect">
             <a:avLst/>
@@ -410,8 +861,8 @@
         </p:nvSpPr>
         <p:spPr>
           <a:xfrm>
-            <a:off x="913794" y="4289374"/>
-            <a:ext cx="10364432" cy="811610"/>
+            <a:off x="685346" y="4289374"/>
+            <a:ext cx="7773324" cy="811610"/>
           </a:xfrm>
         </p:spPr>
         <p:txBody>
@@ -442,8 +893,8 @@
         </p:nvSpPr>
         <p:spPr>
           <a:xfrm>
-            <a:off x="1184744" y="698261"/>
-            <a:ext cx="9822532" cy="3214136"/>
+            <a:off x="888558" y="698261"/>
+            <a:ext cx="7366899" cy="3214136"/>
           </a:xfrm>
           <a:prstGeom prst="roundRect">
             <a:avLst>
@@ -532,8 +983,8 @@
         </p:nvSpPr>
         <p:spPr>
           <a:xfrm>
-            <a:off x="913774" y="5108728"/>
-            <a:ext cx="10364452" cy="682472"/>
+            <a:off x="685331" y="5108728"/>
+            <a:ext cx="7773339" cy="682472"/>
           </a:xfrm>
         </p:spPr>
         <p:txBody>
@@ -602,7 +1053,7 @@
           <a:p>
             <a:fld id="{CBC48EC7-AF6A-48D3-8284-14BACBEBDD84}" type="datetimeFigureOut">
               <a:rPr lang="en-US" smtClean="0"/>
-              <a:t>4/16/16</a:t>
+              <a:t>4/23/16</a:t>
             </a:fld>
             <a:endParaRPr lang="en-US" dirty="0"/>
           </a:p>
@@ -654,7 +1105,7 @@
     </p:spTree>
     <p:extLst>
       <p:ext uri="{BB962C8B-B14F-4D97-AF65-F5344CB8AC3E}">
-        <p14:creationId xmlns:p14="http://schemas.microsoft.com/office/powerpoint/2010/main" val="1998972350"/>
+        <p14:creationId xmlns:p14="http://schemas.microsoft.com/office/powerpoint/2010/main" val="2116949149"/>
       </p:ext>
     </p:extLst>
   </p:cSld>
@@ -684,7 +1135,7 @@
       </p:grpSpPr>
       <p:pic>
         <p:nvPicPr>
-          <p:cNvPr id="8" name="Picture 7" descr="Droplets-HD-Content-R1d.png"/>
+          <p:cNvPr id="9" name="Picture 8" descr="Droplets-SD-Content-R1d.png"/>
           <p:cNvPicPr>
             <a:picLocks noChangeAspect="1"/>
           </p:cNvPicPr>
@@ -705,7 +1156,7 @@
         <p:spPr>
           <a:xfrm>
             <a:off x="0" y="0"/>
-            <a:ext cx="12192000" cy="6858000"/>
+            <a:ext cx="9144000" cy="6858000"/>
           </a:xfrm>
           <a:prstGeom prst="rect">
             <a:avLst/>
@@ -724,8 +1175,8 @@
         </p:nvSpPr>
         <p:spPr>
           <a:xfrm>
-            <a:off x="913774" y="609599"/>
-            <a:ext cx="10364452" cy="3427245"/>
+            <a:off x="685331" y="609600"/>
+            <a:ext cx="7773339" cy="3427245"/>
           </a:xfrm>
         </p:spPr>
         <p:txBody>
@@ -756,8 +1207,8 @@
         </p:nvSpPr>
         <p:spPr>
           <a:xfrm>
-            <a:off x="913775" y="4204821"/>
-            <a:ext cx="10364452" cy="1586380"/>
+            <a:off x="685331" y="4204821"/>
+            <a:ext cx="7773339" cy="1586380"/>
           </a:xfrm>
         </p:spPr>
         <p:txBody>
@@ -826,7 +1277,7 @@
           <a:p>
             <a:fld id="{CBC48EC7-AF6A-48D3-8284-14BACBEBDD84}" type="datetimeFigureOut">
               <a:rPr lang="en-US" smtClean="0"/>
-              <a:t>4/16/16</a:t>
+              <a:t>4/23/16</a:t>
             </a:fld>
             <a:endParaRPr lang="en-US" dirty="0"/>
           </a:p>
@@ -878,7 +1329,7 @@
     </p:spTree>
     <p:extLst>
       <p:ext uri="{BB962C8B-B14F-4D97-AF65-F5344CB8AC3E}">
-        <p14:creationId xmlns:p14="http://schemas.microsoft.com/office/powerpoint/2010/main" val="1494112782"/>
+        <p14:creationId xmlns:p14="http://schemas.microsoft.com/office/powerpoint/2010/main" val="55283747"/>
       </p:ext>
     </p:extLst>
   </p:cSld>
@@ -908,7 +1359,7 @@
       </p:grpSpPr>
       <p:pic>
         <p:nvPicPr>
-          <p:cNvPr id="11" name="Picture 10" descr="Droplets-HD-Content-R1d.png"/>
+          <p:cNvPr id="13" name="Picture 12" descr="Droplets-SD-Content-R1d.png"/>
           <p:cNvPicPr>
             <a:picLocks noChangeAspect="1"/>
           </p:cNvPicPr>
@@ -929,7 +1380,7 @@
         <p:spPr>
           <a:xfrm>
             <a:off x="0" y="0"/>
-            <a:ext cx="12192000" cy="6858000"/>
+            <a:ext cx="9144000" cy="6858000"/>
           </a:xfrm>
           <a:prstGeom prst="rect">
             <a:avLst/>
@@ -948,8 +1399,8 @@
         </p:nvSpPr>
         <p:spPr>
           <a:xfrm>
-            <a:off x="1446212" y="609600"/>
-            <a:ext cx="9302752" cy="2992904"/>
+            <a:off x="1084659" y="872588"/>
+            <a:ext cx="6977064" cy="2729915"/>
           </a:xfrm>
         </p:spPr>
         <p:txBody>
@@ -980,8 +1431,8 @@
         </p:nvSpPr>
         <p:spPr>
           <a:xfrm>
-            <a:off x="1720644" y="3610032"/>
-            <a:ext cx="8752299" cy="594788"/>
+            <a:off x="1290484" y="3610032"/>
+            <a:ext cx="6564224" cy="594788"/>
           </a:xfrm>
         </p:spPr>
         <p:txBody>
@@ -1047,8 +1498,8 @@
         </p:nvSpPr>
         <p:spPr>
           <a:xfrm>
-            <a:off x="913774" y="4372796"/>
-            <a:ext cx="10364452" cy="1421053"/>
+            <a:off x="685331" y="4372797"/>
+            <a:ext cx="7773339" cy="1421053"/>
           </a:xfrm>
         </p:spPr>
         <p:txBody>
@@ -1119,7 +1570,7 @@
           <a:p>
             <a:fld id="{CBC48EC7-AF6A-48D3-8284-14BACBEBDD84}" type="datetimeFigureOut">
               <a:rPr lang="en-US" smtClean="0"/>
-              <a:t>4/16/16</a:t>
+              <a:t>4/23/16</a:t>
             </a:fld>
             <a:endParaRPr lang="en-US" dirty="0"/>
           </a:p>
@@ -1170,14 +1621,14 @@
       </p:sp>
       <p:sp>
         <p:nvSpPr>
-          <p:cNvPr id="13" name="TextBox 12"/>
+          <p:cNvPr id="11" name="TextBox 10"/>
           <p:cNvSpPr txBox="1"/>
           <p:nvPr/>
         </p:nvSpPr>
         <p:spPr>
           <a:xfrm>
-            <a:off x="1001488" y="754166"/>
-            <a:ext cx="609600" cy="584776"/>
+            <a:off x="737626" y="887859"/>
+            <a:ext cx="546888" cy="584776"/>
           </a:xfrm>
           <a:prstGeom prst="rect">
             <a:avLst/>
@@ -1292,8 +1743,8 @@
         </p:nvSpPr>
         <p:spPr>
           <a:xfrm>
-            <a:off x="10557558" y="2993578"/>
-            <a:ext cx="609600" cy="584776"/>
+            <a:off x="7850130" y="3120015"/>
+            <a:ext cx="553641" cy="584776"/>
           </a:xfrm>
           <a:prstGeom prst="rect">
             <a:avLst/>
@@ -1403,7 +1854,7 @@
     </p:spTree>
     <p:extLst>
       <p:ext uri="{BB962C8B-B14F-4D97-AF65-F5344CB8AC3E}">
-        <p14:creationId xmlns:p14="http://schemas.microsoft.com/office/powerpoint/2010/main" val="1027242703"/>
+        <p14:creationId xmlns:p14="http://schemas.microsoft.com/office/powerpoint/2010/main" val="1441000325"/>
       </p:ext>
     </p:extLst>
   </p:cSld>
@@ -1433,7 +1884,7 @@
       </p:grpSpPr>
       <p:pic>
         <p:nvPicPr>
-          <p:cNvPr id="8" name="Picture 7" descr="Droplets-HD-Content-R1d.png"/>
+          <p:cNvPr id="9" name="Picture 8" descr="Droplets-SD-Content-R1d.png"/>
           <p:cNvPicPr>
             <a:picLocks noChangeAspect="1"/>
           </p:cNvPicPr>
@@ -1454,7 +1905,7 @@
         <p:spPr>
           <a:xfrm>
             <a:off x="0" y="0"/>
-            <a:ext cx="12192000" cy="6858000"/>
+            <a:ext cx="9144000" cy="6858000"/>
           </a:xfrm>
           <a:prstGeom prst="rect">
             <a:avLst/>
@@ -1473,8 +1924,8 @@
         </p:nvSpPr>
         <p:spPr>
           <a:xfrm>
-            <a:off x="913775" y="2138721"/>
-            <a:ext cx="10364452" cy="2511835"/>
+            <a:off x="685331" y="2138722"/>
+            <a:ext cx="7773339" cy="2511835"/>
           </a:xfrm>
         </p:spPr>
         <p:txBody>
@@ -1505,8 +1956,8 @@
         </p:nvSpPr>
         <p:spPr>
           <a:xfrm>
-            <a:off x="913775" y="4662335"/>
-            <a:ext cx="10364452" cy="1140644"/>
+            <a:off x="685331" y="4662335"/>
+            <a:ext cx="7773339" cy="1140644"/>
           </a:xfrm>
         </p:spPr>
         <p:txBody>
@@ -1575,7 +2026,7 @@
           <a:p>
             <a:fld id="{CBC48EC7-AF6A-48D3-8284-14BACBEBDD84}" type="datetimeFigureOut">
               <a:rPr lang="en-US" smtClean="0"/>
-              <a:t>4/16/16</a:t>
+              <a:t>4/23/16</a:t>
             </a:fld>
             <a:endParaRPr lang="en-US" dirty="0"/>
           </a:p>
@@ -1627,7 +2078,7 @@
     </p:spTree>
     <p:extLst>
       <p:ext uri="{BB962C8B-B14F-4D97-AF65-F5344CB8AC3E}">
-        <p14:creationId xmlns:p14="http://schemas.microsoft.com/office/powerpoint/2010/main" val="1247071088"/>
+        <p14:creationId xmlns:p14="http://schemas.microsoft.com/office/powerpoint/2010/main" val="1719375056"/>
       </p:ext>
     </p:extLst>
   </p:cSld>
@@ -1657,7 +2108,7 @@
       </p:grpSpPr>
       <p:pic>
         <p:nvPicPr>
-          <p:cNvPr id="13" name="Picture 12" descr="Droplets-HD-Content-R1d.png"/>
+          <p:cNvPr id="14" name="Picture 13" descr="Droplets-SD-Content-R1d.png"/>
           <p:cNvPicPr>
             <a:picLocks noChangeAspect="1"/>
           </p:cNvPicPr>
@@ -1678,7 +2129,7 @@
         <p:spPr>
           <a:xfrm>
             <a:off x="0" y="0"/>
-            <a:ext cx="12192000" cy="6858000"/>
+            <a:ext cx="9144000" cy="6858000"/>
           </a:xfrm>
           <a:prstGeom prst="rect">
             <a:avLst/>
@@ -1697,8 +2148,8 @@
         </p:nvSpPr>
         <p:spPr>
           <a:xfrm>
-            <a:off x="913774" y="609600"/>
-            <a:ext cx="10364452" cy="1605094"/>
+            <a:off x="685331" y="609600"/>
+            <a:ext cx="7773339" cy="1605094"/>
           </a:xfrm>
         </p:spPr>
         <p:txBody>
@@ -1725,8 +2176,8 @@
         </p:nvSpPr>
         <p:spPr>
           <a:xfrm>
-            <a:off x="913774" y="2367093"/>
-            <a:ext cx="3298976" cy="576262"/>
+            <a:off x="685331" y="2367093"/>
+            <a:ext cx="2474232" cy="576262"/>
           </a:xfrm>
         </p:spPr>
         <p:txBody>
@@ -1736,7 +2187,7 @@
           <a:lstStyle>
             <a:lvl1pPr marL="0" indent="0" algn="ctr">
               <a:lnSpc>
-                <a:spcPct val="85000"/>
+                <a:spcPct val="75000"/>
               </a:lnSpc>
               <a:buNone/>
               <a:defRPr sz="2400" b="0">
@@ -1799,8 +2250,8 @@
         </p:nvSpPr>
         <p:spPr>
           <a:xfrm>
-            <a:off x="913774" y="2943355"/>
-            <a:ext cx="3298976" cy="2847845"/>
+            <a:off x="685331" y="2943356"/>
+            <a:ext cx="2474232" cy="2847845"/>
           </a:xfrm>
         </p:spPr>
         <p:txBody>
@@ -1866,8 +2317,8 @@
         </p:nvSpPr>
         <p:spPr>
           <a:xfrm>
-            <a:off x="4452389" y="2367093"/>
-            <a:ext cx="3291521" cy="576262"/>
+            <a:off x="3339292" y="2367093"/>
+            <a:ext cx="2468641" cy="576262"/>
           </a:xfrm>
         </p:spPr>
         <p:txBody>
@@ -1877,7 +2328,7 @@
           <a:lstStyle>
             <a:lvl1pPr marL="0" indent="0" algn="ctr">
               <a:lnSpc>
-                <a:spcPct val="85000"/>
+                <a:spcPct val="75000"/>
               </a:lnSpc>
               <a:buNone/>
               <a:defRPr sz="2400" b="0">
@@ -1940,8 +2391,8 @@
         </p:nvSpPr>
         <p:spPr>
           <a:xfrm>
-            <a:off x="4441348" y="2943355"/>
-            <a:ext cx="3303351" cy="2847845"/>
+            <a:off x="3331012" y="2943356"/>
+            <a:ext cx="2477513" cy="2847845"/>
           </a:xfrm>
         </p:spPr>
         <p:txBody>
@@ -2007,8 +2458,8 @@
         </p:nvSpPr>
         <p:spPr>
           <a:xfrm>
-            <a:off x="7973298" y="2367093"/>
-            <a:ext cx="3304928" cy="576262"/>
+            <a:off x="5979974" y="2367093"/>
+            <a:ext cx="2478696" cy="576262"/>
           </a:xfrm>
         </p:spPr>
         <p:txBody>
@@ -2018,7 +2469,7 @@
           <a:lstStyle>
             <a:lvl1pPr marL="0" indent="0" algn="ctr">
               <a:lnSpc>
-                <a:spcPct val="85000"/>
+                <a:spcPct val="75000"/>
               </a:lnSpc>
               <a:buNone/>
               <a:defRPr sz="2400" b="0">
@@ -2081,8 +2532,8 @@
         </p:nvSpPr>
         <p:spPr>
           <a:xfrm>
-            <a:off x="7973298" y="2943355"/>
-            <a:ext cx="3304928" cy="2847845"/>
+            <a:off x="5979974" y="2943356"/>
+            <a:ext cx="2478696" cy="2847845"/>
           </a:xfrm>
         </p:spPr>
         <p:txBody>
@@ -2153,7 +2604,7 @@
           <a:p>
             <a:fld id="{CBC48EC7-AF6A-48D3-8284-14BACBEBDD84}" type="datetimeFigureOut">
               <a:rPr lang="en-US" smtClean="0"/>
-              <a:t>4/16/16</a:t>
+              <a:t>4/23/16</a:t>
             </a:fld>
             <a:endParaRPr lang="en-US" dirty="0"/>
           </a:p>
@@ -2205,7 +2656,7 @@
     </p:spTree>
     <p:extLst>
       <p:ext uri="{BB962C8B-B14F-4D97-AF65-F5344CB8AC3E}">
-        <p14:creationId xmlns:p14="http://schemas.microsoft.com/office/powerpoint/2010/main" val="83381296"/>
+        <p14:creationId xmlns:p14="http://schemas.microsoft.com/office/powerpoint/2010/main" val="996612160"/>
       </p:ext>
     </p:extLst>
   </p:cSld>
@@ -2235,7 +2686,7 @@
       </p:grpSpPr>
       <p:pic>
         <p:nvPicPr>
-          <p:cNvPr id="16" name="Picture 15" descr="Droplets-HD-Content-R1d.png"/>
+          <p:cNvPr id="17" name="Picture 16" descr="Droplets-SD-Content-R1d.png"/>
           <p:cNvPicPr>
             <a:picLocks noChangeAspect="1"/>
           </p:cNvPicPr>
@@ -2256,7 +2707,7 @@
         <p:spPr>
           <a:xfrm>
             <a:off x="0" y="0"/>
-            <a:ext cx="12192000" cy="6858000"/>
+            <a:ext cx="9144000" cy="6858000"/>
           </a:xfrm>
           <a:prstGeom prst="rect">
             <a:avLst/>
@@ -2275,8 +2726,8 @@
         </p:nvSpPr>
         <p:spPr>
           <a:xfrm>
-            <a:off x="913774" y="610772"/>
-            <a:ext cx="10364452" cy="1603922"/>
+            <a:off x="685331" y="610772"/>
+            <a:ext cx="7773339" cy="1603922"/>
           </a:xfrm>
         </p:spPr>
         <p:txBody>
@@ -2303,8 +2754,8 @@
         </p:nvSpPr>
         <p:spPr>
           <a:xfrm>
-            <a:off x="913774" y="4204820"/>
-            <a:ext cx="3296409" cy="576262"/>
+            <a:off x="685331" y="4204820"/>
+            <a:ext cx="2472307" cy="576262"/>
           </a:xfrm>
         </p:spPr>
         <p:txBody>
@@ -2314,7 +2765,7 @@
           <a:lstStyle>
             <a:lvl1pPr marL="0" indent="0" algn="ctr">
               <a:lnSpc>
-                <a:spcPct val="85000"/>
+                <a:spcPct val="75000"/>
               </a:lnSpc>
               <a:buNone/>
               <a:defRPr sz="2200" b="0">
@@ -2377,8 +2828,8 @@
         </p:nvSpPr>
         <p:spPr>
           <a:xfrm>
-            <a:off x="913774" y="2367093"/>
-            <a:ext cx="3296409" cy="1524000"/>
+            <a:off x="685331" y="2367093"/>
+            <a:ext cx="2472307" cy="1524000"/>
           </a:xfrm>
           <a:prstGeom prst="roundRect">
             <a:avLst>
@@ -2469,8 +2920,8 @@
         </p:nvSpPr>
         <p:spPr>
           <a:xfrm>
-            <a:off x="913774" y="4781082"/>
-            <a:ext cx="3296409" cy="1010118"/>
+            <a:off x="685331" y="4781082"/>
+            <a:ext cx="2472307" cy="1010118"/>
           </a:xfrm>
         </p:spPr>
         <p:txBody>
@@ -2536,8 +2987,8 @@
         </p:nvSpPr>
         <p:spPr>
           <a:xfrm>
-            <a:off x="4442759" y="4204820"/>
-            <a:ext cx="3301828" cy="576262"/>
+            <a:off x="3332069" y="4204820"/>
+            <a:ext cx="2476371" cy="576262"/>
           </a:xfrm>
         </p:spPr>
         <p:txBody>
@@ -2547,7 +2998,7 @@
           <a:lstStyle>
             <a:lvl1pPr marL="0" indent="0" algn="ctr">
               <a:lnSpc>
-                <a:spcPct val="85000"/>
+                <a:spcPct val="75000"/>
               </a:lnSpc>
               <a:buNone/>
               <a:defRPr sz="2200" b="0">
@@ -2610,8 +3061,8 @@
         </p:nvSpPr>
         <p:spPr>
           <a:xfrm>
-            <a:off x="4441348" y="2367093"/>
-            <a:ext cx="3303352" cy="1524000"/>
+            <a:off x="3331011" y="2367093"/>
+            <a:ext cx="2477514" cy="1524000"/>
           </a:xfrm>
           <a:prstGeom prst="roundRect">
             <a:avLst>
@@ -2702,8 +3153,8 @@
         </p:nvSpPr>
         <p:spPr>
           <a:xfrm>
-            <a:off x="4441348" y="4781080"/>
-            <a:ext cx="3303352" cy="1010119"/>
+            <a:off x="3331011" y="4781081"/>
+            <a:ext cx="2477514" cy="1010119"/>
           </a:xfrm>
         </p:spPr>
         <p:txBody>
@@ -2769,8 +3220,8 @@
         </p:nvSpPr>
         <p:spPr>
           <a:xfrm>
-            <a:off x="7973298" y="4204820"/>
-            <a:ext cx="3300681" cy="576262"/>
+            <a:off x="5979974" y="4204820"/>
+            <a:ext cx="2475511" cy="576262"/>
           </a:xfrm>
         </p:spPr>
         <p:txBody>
@@ -2780,7 +3231,7 @@
           <a:lstStyle>
             <a:lvl1pPr marL="0" indent="0" algn="ctr">
               <a:lnSpc>
-                <a:spcPct val="85000"/>
+                <a:spcPct val="75000"/>
               </a:lnSpc>
               <a:buNone/>
               <a:defRPr sz="2200" b="0">
@@ -2843,8 +3294,8 @@
         </p:nvSpPr>
         <p:spPr>
           <a:xfrm>
-            <a:off x="7973298" y="2367093"/>
-            <a:ext cx="3304928" cy="1524000"/>
+            <a:off x="5979974" y="2367093"/>
+            <a:ext cx="2478696" cy="1524000"/>
           </a:xfrm>
           <a:prstGeom prst="roundRect">
             <a:avLst>
@@ -2935,8 +3386,8 @@
         </p:nvSpPr>
         <p:spPr>
           <a:xfrm>
-            <a:off x="7973173" y="4781078"/>
-            <a:ext cx="3305053" cy="1010121"/>
+            <a:off x="5979880" y="4781079"/>
+            <a:ext cx="2478790" cy="1010121"/>
           </a:xfrm>
         </p:spPr>
         <p:txBody>
@@ -3007,7 +3458,7 @@
           <a:p>
             <a:fld id="{CBC48EC7-AF6A-48D3-8284-14BACBEBDD84}" type="datetimeFigureOut">
               <a:rPr lang="en-US" smtClean="0"/>
-              <a:t>4/16/16</a:t>
+              <a:t>4/23/16</a:t>
             </a:fld>
             <a:endParaRPr lang="en-US" dirty="0"/>
           </a:p>
@@ -3059,7 +3510,7 @@
     </p:spTree>
     <p:extLst>
       <p:ext uri="{BB962C8B-B14F-4D97-AF65-F5344CB8AC3E}">
-        <p14:creationId xmlns:p14="http://schemas.microsoft.com/office/powerpoint/2010/main" val="1230104028"/>
+        <p14:creationId xmlns:p14="http://schemas.microsoft.com/office/powerpoint/2010/main" val="1835610167"/>
       </p:ext>
     </p:extLst>
   </p:cSld>
@@ -3089,7 +3540,7 @@
       </p:grpSpPr>
       <p:pic>
         <p:nvPicPr>
-          <p:cNvPr id="8" name="Picture 7" descr="Droplets-HD-Content-R1d.png"/>
+          <p:cNvPr id="9" name="Picture 8" descr="Droplets-SD-Content-R1d.png"/>
           <p:cNvPicPr>
             <a:picLocks noChangeAspect="1"/>
           </p:cNvPicPr>
@@ -3110,7 +3561,7 @@
         <p:spPr>
           <a:xfrm>
             <a:off x="0" y="0"/>
-            <a:ext cx="12192000" cy="6858000"/>
+            <a:ext cx="9144000" cy="6858000"/>
           </a:xfrm>
           <a:prstGeom prst="rect">
             <a:avLst/>
@@ -3152,8 +3603,8 @@
         </p:nvSpPr>
         <p:spPr>
           <a:xfrm>
-            <a:off x="913775" y="2367093"/>
-            <a:ext cx="10364452" cy="3424107"/>
+            <a:off x="685331" y="2367094"/>
+            <a:ext cx="7773339" cy="3424107"/>
           </a:xfrm>
         </p:spPr>
         <p:txBody>
@@ -3214,7 +3665,7 @@
           <a:p>
             <a:fld id="{D11A6AA8-A04B-4104-9AE2-BD48D340E27F}" type="datetimeFigureOut">
               <a:rPr lang="en-US" smtClean="0"/>
-              <a:t>4/16/16</a:t>
+              <a:t>4/23/16</a:t>
             </a:fld>
             <a:endParaRPr lang="en-US" dirty="0"/>
           </a:p>
@@ -3265,7 +3716,7 @@
     </p:spTree>
     <p:extLst>
       <p:ext uri="{BB962C8B-B14F-4D97-AF65-F5344CB8AC3E}">
-        <p14:creationId xmlns:p14="http://schemas.microsoft.com/office/powerpoint/2010/main" val="533328927"/>
+        <p14:creationId xmlns:p14="http://schemas.microsoft.com/office/powerpoint/2010/main" val="350003967"/>
       </p:ext>
     </p:extLst>
   </p:cSld>
@@ -3294,7 +3745,7 @@
       </p:grpSpPr>
       <p:pic>
         <p:nvPicPr>
-          <p:cNvPr id="9" name="Picture 8" descr="Droplets-HD-Content-R1d.png"/>
+          <p:cNvPr id="10" name="Picture 9" descr="Droplets-SD-Content-R1d.png"/>
           <p:cNvPicPr>
             <a:picLocks noChangeAspect="1"/>
           </p:cNvPicPr>
@@ -3315,7 +3766,7 @@
         <p:spPr>
           <a:xfrm>
             <a:off x="0" y="0"/>
-            <a:ext cx="12192000" cy="6858000"/>
+            <a:ext cx="9144000" cy="6858000"/>
           </a:xfrm>
           <a:prstGeom prst="rect">
             <a:avLst/>
@@ -3334,8 +3785,8 @@
         </p:nvSpPr>
         <p:spPr>
           <a:xfrm>
-            <a:off x="8724900" y="609601"/>
-            <a:ext cx="2553326" cy="5181599"/>
+            <a:off x="6543675" y="609602"/>
+            <a:ext cx="1914995" cy="5181599"/>
           </a:xfrm>
         </p:spPr>
         <p:txBody>
@@ -3366,8 +3817,8 @@
         </p:nvSpPr>
         <p:spPr>
           <a:xfrm>
-            <a:off x="913775" y="609601"/>
-            <a:ext cx="7658724" cy="5181599"/>
+            <a:off x="685331" y="609602"/>
+            <a:ext cx="5744043" cy="5181599"/>
           </a:xfrm>
         </p:spPr>
         <p:txBody>
@@ -3428,7 +3879,7 @@
           <a:p>
             <a:fld id="{B4E0BF79-FAC6-4A96-8DE1-F7B82E2E1652}" type="datetimeFigureOut">
               <a:rPr lang="en-US" smtClean="0"/>
-              <a:t>4/16/16</a:t>
+              <a:t>4/23/16</a:t>
             </a:fld>
             <a:endParaRPr lang="en-US" dirty="0"/>
           </a:p>
@@ -3479,7 +3930,7 @@
     </p:spTree>
     <p:extLst>
       <p:ext uri="{BB962C8B-B14F-4D97-AF65-F5344CB8AC3E}">
-        <p14:creationId xmlns:p14="http://schemas.microsoft.com/office/powerpoint/2010/main" val="62533511"/>
+        <p14:creationId xmlns:p14="http://schemas.microsoft.com/office/powerpoint/2010/main" val="558964236"/>
       </p:ext>
     </p:extLst>
   </p:cSld>
@@ -3508,7 +3959,7 @@
       </p:grpSpPr>
       <p:pic>
         <p:nvPicPr>
-          <p:cNvPr id="3" name="Picture 2" descr="Droplets-HD-Content-R1d.png"/>
+          <p:cNvPr id="7" name="Picture 6" descr="Droplets-SD-Content-R1d.png"/>
           <p:cNvPicPr>
             <a:picLocks noChangeAspect="1"/>
           </p:cNvPicPr>
@@ -3529,7 +3980,7 @@
         <p:spPr>
           <a:xfrm>
             <a:off x="0" y="0"/>
-            <a:ext cx="12192000" cy="6858000"/>
+            <a:ext cx="9144000" cy="6858000"/>
           </a:xfrm>
           <a:prstGeom prst="rect">
             <a:avLst/>
@@ -3571,8 +4022,8 @@
         </p:nvSpPr>
         <p:spPr>
           <a:xfrm>
-            <a:off x="913774" y="2367092"/>
-            <a:ext cx="10363826" cy="3424107"/>
+            <a:off x="685330" y="2367093"/>
+            <a:ext cx="7772870" cy="3424107"/>
           </a:xfrm>
         </p:spPr>
         <p:txBody>
@@ -3633,7 +4084,7 @@
           <a:p>
             <a:fld id="{82FF5DD9-2C52-442D-92E2-8072C0C3D7CD}" type="datetimeFigureOut">
               <a:rPr lang="en-US" smtClean="0"/>
-              <a:t>4/16/16</a:t>
+              <a:t>4/23/16</a:t>
             </a:fld>
             <a:endParaRPr lang="en-US" dirty="0"/>
           </a:p>
@@ -3685,7 +4136,7 @@
     </p:spTree>
     <p:extLst>
       <p:ext uri="{BB962C8B-B14F-4D97-AF65-F5344CB8AC3E}">
-        <p14:creationId xmlns:p14="http://schemas.microsoft.com/office/powerpoint/2010/main" val="2032328434"/>
+        <p14:creationId xmlns:p14="http://schemas.microsoft.com/office/powerpoint/2010/main" val="1182923534"/>
       </p:ext>
     </p:extLst>
   </p:cSld>
@@ -3714,7 +4165,7 @@
       </p:grpSpPr>
       <p:pic>
         <p:nvPicPr>
-          <p:cNvPr id="9" name="Picture 8" descr="Droplets-HD-Content-R1d.png"/>
+          <p:cNvPr id="8" name="Picture 7" descr="Droplets-SD-Content-R1d.png"/>
           <p:cNvPicPr>
             <a:picLocks noChangeAspect="1"/>
           </p:cNvPicPr>
@@ -3735,7 +4186,7 @@
         <p:spPr>
           <a:xfrm>
             <a:off x="0" y="0"/>
-            <a:ext cx="12192000" cy="6858000"/>
+            <a:ext cx="9144000" cy="6858000"/>
           </a:xfrm>
           <a:prstGeom prst="rect">
             <a:avLst/>
@@ -3754,8 +4205,8 @@
         </p:nvSpPr>
         <p:spPr>
           <a:xfrm>
-            <a:off x="913774" y="828563"/>
-            <a:ext cx="10351752" cy="2736819"/>
+            <a:off x="685331" y="828564"/>
+            <a:ext cx="7763814" cy="2736819"/>
           </a:xfrm>
         </p:spPr>
         <p:txBody>
@@ -3788,8 +4239,8 @@
         </p:nvSpPr>
         <p:spPr>
           <a:xfrm>
-            <a:off x="913774" y="3657457"/>
-            <a:ext cx="10351752" cy="1368183"/>
+            <a:off x="685331" y="3657458"/>
+            <a:ext cx="7763814" cy="1368183"/>
           </a:xfrm>
         </p:spPr>
         <p:txBody>
@@ -3914,7 +4365,7 @@
           <a:p>
             <a:fld id="{C44961B7-6B89-48AB-966F-622E2788EECC}" type="datetimeFigureOut">
               <a:rPr lang="en-US" smtClean="0"/>
-              <a:t>4/16/16</a:t>
+              <a:t>4/23/16</a:t>
             </a:fld>
             <a:endParaRPr lang="en-US" dirty="0"/>
           </a:p>
@@ -3965,7 +4416,7 @@
     </p:spTree>
     <p:extLst>
       <p:ext uri="{BB962C8B-B14F-4D97-AF65-F5344CB8AC3E}">
-        <p14:creationId xmlns:p14="http://schemas.microsoft.com/office/powerpoint/2010/main" val="1616584703"/>
+        <p14:creationId xmlns:p14="http://schemas.microsoft.com/office/powerpoint/2010/main" val="2139715659"/>
       </p:ext>
     </p:extLst>
   </p:cSld>
@@ -3994,7 +4445,7 @@
       </p:grpSpPr>
       <p:pic>
         <p:nvPicPr>
-          <p:cNvPr id="10" name="Picture 9" descr="Droplets-HD-Content-R1d.png"/>
+          <p:cNvPr id="9" name="Picture 8" descr="Droplets-SD-Content-R1d.png"/>
           <p:cNvPicPr>
             <a:picLocks noChangeAspect="1"/>
           </p:cNvPicPr>
@@ -4015,7 +4466,7 @@
         <p:spPr>
           <a:xfrm>
             <a:off x="0" y="0"/>
-            <a:ext cx="12192000" cy="6858000"/>
+            <a:ext cx="9144000" cy="6858000"/>
           </a:xfrm>
           <a:prstGeom prst="rect">
             <a:avLst/>
@@ -4034,8 +4485,8 @@
         </p:nvSpPr>
         <p:spPr>
           <a:xfrm>
-            <a:off x="913775" y="618517"/>
-            <a:ext cx="10364451" cy="1596177"/>
+            <a:off x="685332" y="618518"/>
+            <a:ext cx="7773338" cy="1596177"/>
           </a:xfrm>
         </p:spPr>
         <p:txBody>
@@ -4062,8 +4513,8 @@
         </p:nvSpPr>
         <p:spPr>
           <a:xfrm>
-            <a:off x="913774" y="2367092"/>
-            <a:ext cx="5106026" cy="3424107"/>
+            <a:off x="685330" y="2367093"/>
+            <a:ext cx="3829520" cy="3424107"/>
           </a:xfrm>
         </p:spPr>
         <p:txBody>
@@ -4119,8 +4570,8 @@
         </p:nvSpPr>
         <p:spPr>
           <a:xfrm>
-            <a:off x="6172200" y="2367092"/>
-            <a:ext cx="5105400" cy="3424107"/>
+            <a:off x="4629150" y="2367093"/>
+            <a:ext cx="3829050" cy="3424107"/>
           </a:xfrm>
         </p:spPr>
         <p:txBody>
@@ -4181,7 +4632,7 @@
           <a:p>
             <a:fld id="{DBD3D6FB-79CC-4683-A046-BBE785BA1BED}" type="datetimeFigureOut">
               <a:rPr lang="en-US" smtClean="0"/>
-              <a:t>4/16/16</a:t>
+              <a:t>4/23/16</a:t>
             </a:fld>
             <a:endParaRPr lang="en-US" dirty="0"/>
           </a:p>
@@ -4232,7 +4683,7 @@
     </p:spTree>
     <p:extLst>
       <p:ext uri="{BB962C8B-B14F-4D97-AF65-F5344CB8AC3E}">
-        <p14:creationId xmlns:p14="http://schemas.microsoft.com/office/powerpoint/2010/main" val="2123485124"/>
+        <p14:creationId xmlns:p14="http://schemas.microsoft.com/office/powerpoint/2010/main" val="439928151"/>
       </p:ext>
     </p:extLst>
   </p:cSld>
@@ -4266,7 +4717,7 @@
       </p:grpSpPr>
       <p:pic>
         <p:nvPicPr>
-          <p:cNvPr id="15" name="Picture 14" descr="Droplets-HD-Content-R1d.png"/>
+          <p:cNvPr id="11" name="Picture 10" descr="Droplets-SD-Content-R1d.png"/>
           <p:cNvPicPr>
             <a:picLocks noChangeAspect="1"/>
           </p:cNvPicPr>
@@ -4287,7 +4738,7 @@
         <p:spPr>
           <a:xfrm>
             <a:off x="0" y="0"/>
-            <a:ext cx="12192000" cy="6858000"/>
+            <a:ext cx="9144000" cy="6858000"/>
           </a:xfrm>
           <a:prstGeom prst="rect">
             <a:avLst/>
@@ -4306,8 +4757,8 @@
         </p:nvSpPr>
         <p:spPr>
           <a:xfrm>
-            <a:off x="913775" y="618517"/>
-            <a:ext cx="10364451" cy="1596177"/>
+            <a:off x="685332" y="618518"/>
+            <a:ext cx="7773338" cy="1596177"/>
           </a:xfrm>
         </p:spPr>
         <p:txBody>
@@ -4334,8 +4785,8 @@
         </p:nvSpPr>
         <p:spPr>
           <a:xfrm>
-            <a:off x="1146328" y="2371018"/>
-            <a:ext cx="4873474" cy="679994"/>
+            <a:off x="859746" y="2371018"/>
+            <a:ext cx="3655106" cy="679994"/>
           </a:xfrm>
         </p:spPr>
         <p:txBody>
@@ -4345,7 +4796,7 @@
           <a:lstStyle>
             <a:lvl1pPr marL="0" indent="0">
               <a:lnSpc>
-                <a:spcPct val="85000"/>
+                <a:spcPct val="75000"/>
               </a:lnSpc>
               <a:buNone/>
               <a:defRPr sz="2600" b="0">
@@ -4408,8 +4859,8 @@
         </p:nvSpPr>
         <p:spPr>
           <a:xfrm>
-            <a:off x="913774" y="3051012"/>
-            <a:ext cx="5106027" cy="2740187"/>
+            <a:off x="685331" y="3051013"/>
+            <a:ext cx="3829520" cy="2740187"/>
           </a:xfrm>
         </p:spPr>
         <p:txBody>
@@ -4465,8 +4916,8 @@
         </p:nvSpPr>
         <p:spPr>
           <a:xfrm>
-            <a:off x="6396423" y="2371018"/>
-            <a:ext cx="4881804" cy="679994"/>
+            <a:off x="4797317" y="2371018"/>
+            <a:ext cx="3661353" cy="679994"/>
           </a:xfrm>
         </p:spPr>
         <p:txBody>
@@ -4476,7 +4927,7 @@
           <a:lstStyle>
             <a:lvl1pPr marL="0" indent="0">
               <a:lnSpc>
-                <a:spcPct val="85000"/>
+                <a:spcPct val="75000"/>
               </a:lnSpc>
               <a:buNone/>
               <a:defRPr sz="2600" b="0">
@@ -4539,8 +4990,8 @@
         </p:nvSpPr>
         <p:spPr>
           <a:xfrm>
-            <a:off x="6172200" y="3051012"/>
-            <a:ext cx="5105401" cy="2740187"/>
+            <a:off x="4629150" y="3051013"/>
+            <a:ext cx="3829051" cy="2740187"/>
           </a:xfrm>
         </p:spPr>
         <p:txBody>
@@ -4601,7 +5052,7 @@
           <a:p>
             <a:fld id="{9512B3E8-48F1-4B23-8498-D8A04A81EC9C}" type="datetimeFigureOut">
               <a:rPr lang="en-US" smtClean="0"/>
-              <a:t>4/16/16</a:t>
+              <a:t>4/23/16</a:t>
             </a:fld>
             <a:endParaRPr lang="en-US" dirty="0"/>
           </a:p>
@@ -4652,7 +5103,7 @@
     </p:spTree>
     <p:extLst>
       <p:ext uri="{BB962C8B-B14F-4D97-AF65-F5344CB8AC3E}">
-        <p14:creationId xmlns:p14="http://schemas.microsoft.com/office/powerpoint/2010/main" val="383749575"/>
+        <p14:creationId xmlns:p14="http://schemas.microsoft.com/office/powerpoint/2010/main" val="86237236"/>
       </p:ext>
     </p:extLst>
   </p:cSld>
@@ -4686,7 +5137,7 @@
       </p:grpSpPr>
       <p:pic>
         <p:nvPicPr>
-          <p:cNvPr id="8" name="Picture 7" descr="Droplets-HD-Content-R1d.png"/>
+          <p:cNvPr id="7" name="Picture 6" descr="Droplets-SD-Content-R1d.png"/>
           <p:cNvPicPr>
             <a:picLocks noChangeAspect="1"/>
           </p:cNvPicPr>
@@ -4707,7 +5158,7 @@
         <p:spPr>
           <a:xfrm>
             <a:off x="0" y="0"/>
-            <a:ext cx="12192000" cy="6858000"/>
+            <a:ext cx="9144000" cy="6858000"/>
           </a:xfrm>
           <a:prstGeom prst="rect">
             <a:avLst/>
@@ -4754,7 +5205,7 @@
           <a:p>
             <a:fld id="{10B90D90-AA62-404D-A741-635B4370F9CB}" type="datetimeFigureOut">
               <a:rPr lang="en-US" smtClean="0"/>
-              <a:t>4/16/16</a:t>
+              <a:t>4/23/16</a:t>
             </a:fld>
             <a:endParaRPr lang="en-US" dirty="0"/>
           </a:p>
@@ -4805,7 +5256,7 @@
     </p:spTree>
     <p:extLst>
       <p:ext uri="{BB962C8B-B14F-4D97-AF65-F5344CB8AC3E}">
-        <p14:creationId xmlns:p14="http://schemas.microsoft.com/office/powerpoint/2010/main" val="785715084"/>
+        <p14:creationId xmlns:p14="http://schemas.microsoft.com/office/powerpoint/2010/main" val="1985247374"/>
       </p:ext>
     </p:extLst>
   </p:cSld>
@@ -4834,7 +5285,7 @@
       </p:grpSpPr>
       <p:pic>
         <p:nvPicPr>
-          <p:cNvPr id="7" name="Picture 6" descr="Droplets-HD-Content-R1d.png"/>
+          <p:cNvPr id="6" name="Picture 5" descr="Droplets-SD-Content-R1d.png"/>
           <p:cNvPicPr>
             <a:picLocks noChangeAspect="1"/>
           </p:cNvPicPr>
@@ -4855,7 +5306,7 @@
         <p:spPr>
           <a:xfrm>
             <a:off x="0" y="0"/>
-            <a:ext cx="12192000" cy="6858000"/>
+            <a:ext cx="9144000" cy="6858000"/>
           </a:xfrm>
           <a:prstGeom prst="rect">
             <a:avLst/>
@@ -4879,7 +5330,7 @@
           <a:p>
             <a:fld id="{A57002E4-6836-46D1-9DBB-3C27C0DD3A89}" type="datetimeFigureOut">
               <a:rPr lang="en-US" smtClean="0"/>
-              <a:t>4/16/16</a:t>
+              <a:t>4/23/16</a:t>
             </a:fld>
             <a:endParaRPr lang="en-US" dirty="0"/>
           </a:p>
@@ -4930,7 +5381,7 @@
     </p:spTree>
     <p:extLst>
       <p:ext uri="{BB962C8B-B14F-4D97-AF65-F5344CB8AC3E}">
-        <p14:creationId xmlns:p14="http://schemas.microsoft.com/office/powerpoint/2010/main" val="636471385"/>
+        <p14:creationId xmlns:p14="http://schemas.microsoft.com/office/powerpoint/2010/main" val="599191379"/>
       </p:ext>
     </p:extLst>
   </p:cSld>
@@ -4964,7 +5415,7 @@
       </p:grpSpPr>
       <p:pic>
         <p:nvPicPr>
-          <p:cNvPr id="11" name="Picture 10" descr="Droplets-HD-Content-R1d.png"/>
+          <p:cNvPr id="9" name="Picture 8" descr="Droplets-SD-Content-R1d.png"/>
           <p:cNvPicPr>
             <a:picLocks noChangeAspect="1"/>
           </p:cNvPicPr>
@@ -4985,7 +5436,7 @@
         <p:spPr>
           <a:xfrm>
             <a:off x="0" y="0"/>
-            <a:ext cx="12192000" cy="6858000"/>
+            <a:ext cx="9144000" cy="6858000"/>
           </a:xfrm>
           <a:prstGeom prst="rect">
             <a:avLst/>
@@ -5004,8 +5455,8 @@
         </p:nvSpPr>
         <p:spPr>
           <a:xfrm>
-            <a:off x="913775" y="609600"/>
-            <a:ext cx="3935688" cy="2023252"/>
+            <a:off x="685331" y="609600"/>
+            <a:ext cx="2951766" cy="2023252"/>
           </a:xfrm>
         </p:spPr>
         <p:txBody>
@@ -5036,8 +5487,8 @@
         </p:nvSpPr>
         <p:spPr>
           <a:xfrm>
-            <a:off x="5078062" y="609600"/>
-            <a:ext cx="6200163" cy="5181599"/>
+            <a:off x="3808547" y="609601"/>
+            <a:ext cx="4650122" cy="5181599"/>
           </a:xfrm>
         </p:spPr>
         <p:txBody>
@@ -5093,8 +5544,8 @@
         </p:nvSpPr>
         <p:spPr>
           <a:xfrm>
-            <a:off x="913774" y="2632852"/>
-            <a:ext cx="3935689" cy="3158348"/>
+            <a:off x="685331" y="2632852"/>
+            <a:ext cx="2951767" cy="3158348"/>
           </a:xfrm>
         </p:spPr>
         <p:txBody>
@@ -5163,7 +5614,7 @@
           <a:p>
             <a:fld id="{1CF131DD-A141-4471-BCF9-C6073EDD7E20}" type="datetimeFigureOut">
               <a:rPr lang="en-US" smtClean="0"/>
-              <a:t>4/16/16</a:t>
+              <a:t>4/23/16</a:t>
             </a:fld>
             <a:endParaRPr lang="en-US" dirty="0"/>
           </a:p>
@@ -5215,7 +5666,7 @@
     </p:spTree>
     <p:extLst>
       <p:ext uri="{BB962C8B-B14F-4D97-AF65-F5344CB8AC3E}">
-        <p14:creationId xmlns:p14="http://schemas.microsoft.com/office/powerpoint/2010/main" val="558521988"/>
+        <p14:creationId xmlns:p14="http://schemas.microsoft.com/office/powerpoint/2010/main" val="1058686070"/>
       </p:ext>
     </p:extLst>
   </p:cSld>
@@ -5249,7 +5700,7 @@
       </p:grpSpPr>
       <p:pic>
         <p:nvPicPr>
-          <p:cNvPr id="10" name="Picture 9" descr="Droplets-HD-Content-R1d.png"/>
+          <p:cNvPr id="9" name="Picture 8" descr="Droplets-SD-Content-R1d.png"/>
           <p:cNvPicPr>
             <a:picLocks noChangeAspect="1"/>
           </p:cNvPicPr>
@@ -5270,7 +5721,7 @@
         <p:spPr>
           <a:xfrm>
             <a:off x="0" y="0"/>
-            <a:ext cx="12192000" cy="6858000"/>
+            <a:ext cx="9144000" cy="6858000"/>
           </a:xfrm>
           <a:prstGeom prst="rect">
             <a:avLst/>
@@ -5289,8 +5740,8 @@
         </p:nvSpPr>
         <p:spPr>
           <a:xfrm>
-            <a:off x="913774" y="609600"/>
-            <a:ext cx="5934969" cy="2023254"/>
+            <a:off x="685332" y="609600"/>
+            <a:ext cx="4129618" cy="2023254"/>
           </a:xfrm>
         </p:spPr>
         <p:txBody>
@@ -5321,8 +5772,8 @@
         </p:nvSpPr>
         <p:spPr>
           <a:xfrm>
-            <a:off x="7424803" y="609601"/>
-            <a:ext cx="3255358" cy="5181600"/>
+            <a:off x="5004270" y="609601"/>
+            <a:ext cx="3005851" cy="5181600"/>
           </a:xfrm>
           <a:prstGeom prst="roundRect">
             <a:avLst>
@@ -5411,8 +5862,8 @@
         </p:nvSpPr>
         <p:spPr>
           <a:xfrm>
-            <a:off x="913794" y="2632852"/>
-            <a:ext cx="5934949" cy="3158347"/>
+            <a:off x="685346" y="2632853"/>
+            <a:ext cx="4129604" cy="3158347"/>
           </a:xfrm>
         </p:spPr>
         <p:txBody>
@@ -5481,7 +5932,7 @@
           <a:p>
             <a:fld id="{AB334A90-EB03-42F3-8859-2C2B2724C058}" type="datetimeFigureOut">
               <a:rPr lang="en-US" smtClean="0"/>
-              <a:t>4/16/16</a:t>
+              <a:t>4/23/16</a:t>
             </a:fld>
             <a:endParaRPr lang="en-US" dirty="0"/>
           </a:p>
@@ -5533,7 +5984,7 @@
     </p:spTree>
     <p:extLst>
       <p:ext uri="{BB962C8B-B14F-4D97-AF65-F5344CB8AC3E}">
-        <p14:creationId xmlns:p14="http://schemas.microsoft.com/office/powerpoint/2010/main" val="428031279"/>
+        <p14:creationId xmlns:p14="http://schemas.microsoft.com/office/powerpoint/2010/main" val="1434763095"/>
       </p:ext>
     </p:extLst>
   </p:cSld>
@@ -5589,8 +6040,8 @@
         </p:blipFill>
         <p:spPr bwMode="auto">
           <a:xfrm>
-            <a:off x="0" y="-1"/>
-            <a:ext cx="12192003" cy="6858001"/>
+            <a:off x="1" y="-1"/>
+            <a:ext cx="9144002" cy="6858001"/>
           </a:xfrm>
           <a:prstGeom prst="rect">
             <a:avLst/>
@@ -5619,8 +6070,8 @@
         </p:nvSpPr>
         <p:spPr>
           <a:xfrm>
-            <a:off x="913775" y="618517"/>
-            <a:ext cx="10364451" cy="1596177"/>
+            <a:off x="685332" y="618518"/>
+            <a:ext cx="7773338" cy="1596177"/>
           </a:xfrm>
           <a:prstGeom prst="rect">
             <a:avLst/>
@@ -5652,8 +6103,8 @@
         </p:nvSpPr>
         <p:spPr>
           <a:xfrm>
-            <a:off x="913775" y="2367093"/>
-            <a:ext cx="10364452" cy="3424107"/>
+            <a:off x="685331" y="2367094"/>
+            <a:ext cx="7773339" cy="3424107"/>
           </a:xfrm>
           <a:prstGeom prst="rect">
             <a:avLst/>
@@ -5714,8 +6165,8 @@
         </p:nvSpPr>
         <p:spPr>
           <a:xfrm>
-            <a:off x="7678737" y="5883275"/>
-            <a:ext cx="2743200" cy="365125"/>
+            <a:off x="5759053" y="5883276"/>
+            <a:ext cx="2057400" cy="365125"/>
           </a:xfrm>
           <a:prstGeom prst="rect">
             <a:avLst/>
@@ -5735,7 +6186,7 @@
           <a:p>
             <a:fld id="{CBC48EC7-AF6A-48D3-8284-14BACBEBDD84}" type="datetimeFigureOut">
               <a:rPr lang="en-US" smtClean="0"/>
-              <a:t>4/16/16</a:t>
+              <a:t>4/23/16</a:t>
             </a:fld>
             <a:endParaRPr lang="en-US" dirty="0"/>
           </a:p>
@@ -5753,8 +6204,8 @@
         </p:nvSpPr>
         <p:spPr>
           <a:xfrm>
-            <a:off x="913774" y="5883275"/>
-            <a:ext cx="6672887" cy="365125"/>
+            <a:off x="685331" y="5883276"/>
+            <a:ext cx="5004665" cy="365125"/>
           </a:xfrm>
           <a:prstGeom prst="rect">
             <a:avLst/>
@@ -5788,8 +6239,8 @@
         </p:nvSpPr>
         <p:spPr>
           <a:xfrm>
-            <a:off x="10514011" y="5883275"/>
-            <a:ext cx="764215" cy="365125"/>
+            <a:off x="7885509" y="5883276"/>
+            <a:ext cx="573161" cy="365125"/>
           </a:xfrm>
           <a:prstGeom prst="rect">
             <a:avLst/>
@@ -5819,29 +6270,29 @@
     </p:spTree>
     <p:extLst>
       <p:ext uri="{BB962C8B-B14F-4D97-AF65-F5344CB8AC3E}">
-        <p14:creationId xmlns:p14="http://schemas.microsoft.com/office/powerpoint/2010/main" val="1063466924"/>
+        <p14:creationId xmlns:p14="http://schemas.microsoft.com/office/powerpoint/2010/main" val="1807215918"/>
       </p:ext>
     </p:extLst>
   </p:cSld>
   <p:clrMap bg1="lt1" tx1="dk1" bg2="lt2" tx2="dk2" accent1="accent1" accent2="accent2" accent3="accent3" accent4="accent4" accent5="accent5" accent6="accent6" hlink="hlink" folHlink="folHlink"/>
   <p:sldLayoutIdLst>
-    <p:sldLayoutId id="2147484063" r:id="rId1"/>
-    <p:sldLayoutId id="2147484064" r:id="rId2"/>
-    <p:sldLayoutId id="2147484065" r:id="rId3"/>
-    <p:sldLayoutId id="2147484066" r:id="rId4"/>
-    <p:sldLayoutId id="2147484067" r:id="rId5"/>
-    <p:sldLayoutId id="2147484068" r:id="rId6"/>
-    <p:sldLayoutId id="2147484069" r:id="rId7"/>
-    <p:sldLayoutId id="2147484070" r:id="rId8"/>
-    <p:sldLayoutId id="2147484071" r:id="rId9"/>
-    <p:sldLayoutId id="2147484072" r:id="rId10"/>
-    <p:sldLayoutId id="2147484073" r:id="rId11"/>
-    <p:sldLayoutId id="2147484074" r:id="rId12"/>
-    <p:sldLayoutId id="2147484075" r:id="rId13"/>
-    <p:sldLayoutId id="2147484076" r:id="rId14"/>
-    <p:sldLayoutId id="2147484077" r:id="rId15"/>
-    <p:sldLayoutId id="2147484078" r:id="rId16"/>
-    <p:sldLayoutId id="2147484079" r:id="rId17"/>
+    <p:sldLayoutId id="2147484865" r:id="rId1"/>
+    <p:sldLayoutId id="2147484866" r:id="rId2"/>
+    <p:sldLayoutId id="2147484867" r:id="rId3"/>
+    <p:sldLayoutId id="2147484868" r:id="rId4"/>
+    <p:sldLayoutId id="2147484869" r:id="rId5"/>
+    <p:sldLayoutId id="2147484870" r:id="rId6"/>
+    <p:sldLayoutId id="2147484871" r:id="rId7"/>
+    <p:sldLayoutId id="2147484872" r:id="rId8"/>
+    <p:sldLayoutId id="2147484873" r:id="rId9"/>
+    <p:sldLayoutId id="2147484874" r:id="rId10"/>
+    <p:sldLayoutId id="2147484875" r:id="rId11"/>
+    <p:sldLayoutId id="2147484876" r:id="rId12"/>
+    <p:sldLayoutId id="2147484877" r:id="rId13"/>
+    <p:sldLayoutId id="2147484878" r:id="rId14"/>
+    <p:sldLayoutId id="2147484879" r:id="rId15"/>
+    <p:sldLayoutId id="2147484880" r:id="rId16"/>
+    <p:sldLayoutId id="2147484881" r:id="rId17"/>
   </p:sldLayoutIdLst>
   <p:hf sldNum="0" hdr="0" ftr="0" dt="0"/>
   <p:txStyles>
@@ -6172,6 +6623,34 @@
 <file path=ppt/slides/slide1.xml><?xml version="1.0" encoding="utf-8"?>
 <p:sld xmlns:a="http://schemas.openxmlformats.org/drawingml/2006/main" xmlns:r="http://schemas.openxmlformats.org/officeDocument/2006/relationships" xmlns:p="http://schemas.openxmlformats.org/presentationml/2006/main">
   <p:cSld>
+    <p:bg>
+      <p:bgPr>
+        <a:gradFill flip="none" rotWithShape="1">
+          <a:gsLst>
+            <a:gs pos="0">
+              <a:schemeClr val="accent4">
+                <a:lumMod val="67000"/>
+              </a:schemeClr>
+            </a:gs>
+            <a:gs pos="48000">
+              <a:schemeClr val="accent4">
+                <a:lumMod val="97000"/>
+                <a:lumOff val="3000"/>
+              </a:schemeClr>
+            </a:gs>
+            <a:gs pos="100000">
+              <a:schemeClr val="accent4">
+                <a:lumMod val="60000"/>
+                <a:lumOff val="40000"/>
+              </a:schemeClr>
+            </a:gs>
+          </a:gsLst>
+          <a:lin ang="16200000" scaled="1"/>
+          <a:tileRect/>
+        </a:gradFill>
+        <a:effectLst/>
+      </p:bgPr>
+    </p:bg>
     <p:spTree>
       <p:nvGrpSpPr>
         <p:cNvPr id="1" name=""/>
@@ -6245,9 +6724,17 @@
 </p:sld>
 </file>
 
-<file path=ppt/slides/slide2.xml><?xml version="1.0" encoding="utf-8"?>
+<file path=ppt/slides/slide10.xml><?xml version="1.0" encoding="utf-8"?>
 <p:sld xmlns:a="http://schemas.openxmlformats.org/drawingml/2006/main" xmlns:r="http://schemas.openxmlformats.org/officeDocument/2006/relationships" xmlns:p="http://schemas.openxmlformats.org/presentationml/2006/main">
   <p:cSld>
+    <p:bg>
+      <p:bgPr>
+        <a:solidFill>
+          <a:schemeClr val="accent4"/>
+        </a:solidFill>
+        <a:effectLst/>
+      </p:bgPr>
+    </p:bg>
     <p:spTree>
       <p:nvGrpSpPr>
         <p:cNvPr id="1" name=""/>
@@ -6279,15 +6766,15 @@
           <a:p>
             <a:r>
               <a:rPr lang="en-US" dirty="0" smtClean="0"/>
-              <a:t>Dataset Taken FROM</a:t>
-            </a:r>
-            <a:endParaRPr lang="en-US" dirty="0"/>
-          </a:p>
-        </p:txBody>
-      </p:sp>
-      <p:sp>
-        <p:nvSpPr>
-          <p:cNvPr id="3" name="Content Placeholder 2"/>
+              <a:t>Result</a:t>
+            </a:r>
+            <a:endParaRPr lang="en-US" dirty="0"/>
+          </a:p>
+        </p:txBody>
+      </p:sp>
+      <p:sp>
+        <p:nvSpPr>
+          <p:cNvPr id="8" name="Content Placeholder 7"/>
           <p:cNvSpPr>
             <a:spLocks noGrp="1"/>
           </p:cNvSpPr>
@@ -6300,516 +6787,13 @@
           <a:bodyPr/>
           <a:lstStyle/>
           <a:p>
-            <a:pPr marL="0" indent="0">
-              <a:buNone/>
-            </a:pPr>
             <a:r>
               <a:rPr lang="en-US" dirty="0" smtClean="0"/>
-              <a:t> </a:t>
-            </a:r>
-            <a:endParaRPr lang="en-US" dirty="0"/>
-          </a:p>
-          <a:p>
-            <a:r>
-              <a:rPr lang="en-US" dirty="0" smtClean="0">
-                <a:hlinkClick r:id="rId2"/>
-              </a:rPr>
-              <a:t>https</a:t>
-            </a:r>
-            <a:r>
-              <a:rPr lang="en-US" dirty="0">
-                <a:hlinkClick r:id="rId2"/>
-              </a:rPr>
-              <a:t>://</a:t>
-            </a:r>
-            <a:r>
-              <a:rPr lang="en-US" dirty="0" smtClean="0">
-                <a:hlinkClick r:id="rId2"/>
-              </a:rPr>
-              <a:t>github.com/chicheongweng/MITx-15.071x-The-Analytics-Edge/blob/master/data/parole.csv</a:t>
-            </a:r>
-            <a:endParaRPr lang="en-US" dirty="0" smtClean="0"/>
-          </a:p>
-          <a:p>
-            <a:endParaRPr lang="en-US" dirty="0"/>
-          </a:p>
-          <a:p>
+              <a:t>Using both logistic regression and decision tree, I got 88</a:t>
+            </a:r>
             <a:r>
               <a:rPr lang="en-US" dirty="0" smtClean="0"/>
-              <a:t>Used 409 </a:t>
-            </a:r>
-            <a:r>
-              <a:rPr lang="en-US" dirty="0" err="1" smtClean="0"/>
-              <a:t>instaces</a:t>
-            </a:r>
-            <a:r>
-              <a:rPr lang="en-US" dirty="0" smtClean="0"/>
-              <a:t> out of 675 available</a:t>
-            </a:r>
-          </a:p>
-          <a:p>
-            <a:pPr marL="0" indent="0">
-              <a:buNone/>
-            </a:pPr>
-            <a:endParaRPr lang="en-US" dirty="0"/>
-          </a:p>
-        </p:txBody>
-      </p:sp>
-    </p:spTree>
-    <p:extLst>
-      <p:ext uri="{BB962C8B-B14F-4D97-AF65-F5344CB8AC3E}">
-        <p14:creationId xmlns:p14="http://schemas.microsoft.com/office/powerpoint/2010/main" val="604148373"/>
-      </p:ext>
-    </p:extLst>
-  </p:cSld>
-  <p:clrMapOvr>
-    <a:masterClrMapping/>
-  </p:clrMapOvr>
-</p:sld>
-</file>
-
-<file path=ppt/slides/slide3.xml><?xml version="1.0" encoding="utf-8"?>
-<p:sld xmlns:a="http://schemas.openxmlformats.org/drawingml/2006/main" xmlns:r="http://schemas.openxmlformats.org/officeDocument/2006/relationships" xmlns:p="http://schemas.openxmlformats.org/presentationml/2006/main">
-  <p:cSld>
-    <p:spTree>
-      <p:nvGrpSpPr>
-        <p:cNvPr id="1" name=""/>
-        <p:cNvGrpSpPr/>
-        <p:nvPr/>
-      </p:nvGrpSpPr>
-      <p:grpSpPr>
-        <a:xfrm>
-          <a:off x="0" y="0"/>
-          <a:ext cx="0" cy="0"/>
-          <a:chOff x="0" y="0"/>
-          <a:chExt cx="0" cy="0"/>
-        </a:xfrm>
-      </p:grpSpPr>
-      <p:sp>
-        <p:nvSpPr>
-          <p:cNvPr id="2" name="Title 1"/>
-          <p:cNvSpPr>
-            <a:spLocks noGrp="1"/>
-          </p:cNvSpPr>
-          <p:nvPr>
-            <p:ph type="title"/>
-          </p:nvPr>
-        </p:nvSpPr>
-        <p:spPr/>
-        <p:txBody>
-          <a:bodyPr/>
-          <a:lstStyle/>
-          <a:p>
-            <a:r>
-              <a:rPr lang="en-US" dirty="0" smtClean="0"/>
-              <a:t>Parole violation dataset</a:t>
-            </a:r>
-            <a:endParaRPr lang="en-US" dirty="0"/>
-          </a:p>
-        </p:txBody>
-      </p:sp>
-      <p:pic>
-        <p:nvPicPr>
-          <p:cNvPr id="4" name="Content Placeholder 3"/>
-          <p:cNvPicPr>
-            <a:picLocks noGrp="1" noChangeAspect="1"/>
-          </p:cNvPicPr>
-          <p:nvPr>
-            <p:ph sz="quarter" idx="13"/>
-          </p:nvPr>
-        </p:nvPicPr>
-        <p:blipFill>
-          <a:blip r:embed="rId2">
-            <a:extLst>
-              <a:ext uri="{28A0092B-C50C-407E-A947-70E740481C1C}">
-                <a14:useLocalDpi xmlns:a14="http://schemas.microsoft.com/office/drawing/2010/main" val="0"/>
-              </a:ext>
-            </a:extLst>
-          </a:blip>
-          <a:stretch>
-            <a:fillRect/>
-          </a:stretch>
-        </p:blipFill>
-        <p:spPr>
-          <a:xfrm>
-            <a:off x="2021305" y="2366963"/>
-            <a:ext cx="7856621" cy="4234679"/>
-          </a:xfrm>
-        </p:spPr>
-      </p:pic>
-    </p:spTree>
-    <p:extLst>
-      <p:ext uri="{BB962C8B-B14F-4D97-AF65-F5344CB8AC3E}">
-        <p14:creationId xmlns:p14="http://schemas.microsoft.com/office/powerpoint/2010/main" val="743958127"/>
-      </p:ext>
-    </p:extLst>
-  </p:cSld>
-  <p:clrMapOvr>
-    <a:masterClrMapping/>
-  </p:clrMapOvr>
-</p:sld>
-</file>
-
-<file path=ppt/slides/slide4.xml><?xml version="1.0" encoding="utf-8"?>
-<p:sld xmlns:a="http://schemas.openxmlformats.org/drawingml/2006/main" xmlns:r="http://schemas.openxmlformats.org/officeDocument/2006/relationships" xmlns:p="http://schemas.openxmlformats.org/presentationml/2006/main">
-  <p:cSld>
-    <p:spTree>
-      <p:nvGrpSpPr>
-        <p:cNvPr id="1" name=""/>
-        <p:cNvGrpSpPr/>
-        <p:nvPr/>
-      </p:nvGrpSpPr>
-      <p:grpSpPr>
-        <a:xfrm>
-          <a:off x="0" y="0"/>
-          <a:ext cx="0" cy="0"/>
-          <a:chOff x="0" y="0"/>
-          <a:chExt cx="0" cy="0"/>
-        </a:xfrm>
-      </p:grpSpPr>
-      <p:sp>
-        <p:nvSpPr>
-          <p:cNvPr id="2" name="Title 1"/>
-          <p:cNvSpPr>
-            <a:spLocks noGrp="1"/>
-          </p:cNvSpPr>
-          <p:nvPr>
-            <p:ph type="title"/>
-          </p:nvPr>
-        </p:nvSpPr>
-        <p:spPr/>
-        <p:txBody>
-          <a:bodyPr/>
-          <a:lstStyle/>
-          <a:p>
-            <a:r>
-              <a:rPr lang="en-US" dirty="0" smtClean="0"/>
-              <a:t>Libraries Used</a:t>
-            </a:r>
-            <a:endParaRPr lang="en-US" dirty="0"/>
-          </a:p>
-        </p:txBody>
-      </p:sp>
-      <p:sp>
-        <p:nvSpPr>
-          <p:cNvPr id="3" name="Content Placeholder 2"/>
-          <p:cNvSpPr>
-            <a:spLocks noGrp="1"/>
-          </p:cNvSpPr>
-          <p:nvPr>
-            <p:ph sz="quarter" idx="13"/>
-          </p:nvPr>
-        </p:nvSpPr>
-        <p:spPr/>
-        <p:txBody>
-          <a:bodyPr/>
-          <a:lstStyle/>
-          <a:p>
-            <a:r>
-              <a:rPr lang="en-US" dirty="0" err="1" smtClean="0"/>
-              <a:t>NUMPy</a:t>
-            </a:r>
-            <a:endParaRPr lang="en-US" dirty="0" smtClean="0"/>
-          </a:p>
-          <a:p>
-            <a:r>
-              <a:rPr lang="en-US" dirty="0" smtClean="0"/>
-              <a:t>SCIPY</a:t>
-            </a:r>
-          </a:p>
-          <a:p>
-            <a:r>
-              <a:rPr lang="en-US" dirty="0" err="1" smtClean="0"/>
-              <a:t>Sklearn</a:t>
-            </a:r>
-            <a:endParaRPr lang="en-US" dirty="0" smtClean="0"/>
-          </a:p>
-          <a:p>
-            <a:pPr marL="0" indent="0">
-              <a:buNone/>
-            </a:pPr>
-            <a:endParaRPr lang="en-US" dirty="0"/>
-          </a:p>
-        </p:txBody>
-      </p:sp>
-    </p:spTree>
-    <p:extLst>
-      <p:ext uri="{BB962C8B-B14F-4D97-AF65-F5344CB8AC3E}">
-        <p14:creationId xmlns:p14="http://schemas.microsoft.com/office/powerpoint/2010/main" val="1467733893"/>
-      </p:ext>
-    </p:extLst>
-  </p:cSld>
-  <p:clrMapOvr>
-    <a:masterClrMapping/>
-  </p:clrMapOvr>
-</p:sld>
-</file>
-
-<file path=ppt/slides/slide5.xml><?xml version="1.0" encoding="utf-8"?>
-<p:sld xmlns:a="http://schemas.openxmlformats.org/drawingml/2006/main" xmlns:r="http://schemas.openxmlformats.org/officeDocument/2006/relationships" xmlns:p="http://schemas.openxmlformats.org/presentationml/2006/main">
-  <p:cSld>
-    <p:spTree>
-      <p:nvGrpSpPr>
-        <p:cNvPr id="1" name=""/>
-        <p:cNvGrpSpPr/>
-        <p:nvPr/>
-      </p:nvGrpSpPr>
-      <p:grpSpPr>
-        <a:xfrm>
-          <a:off x="0" y="0"/>
-          <a:ext cx="0" cy="0"/>
-          <a:chOff x="0" y="0"/>
-          <a:chExt cx="0" cy="0"/>
-        </a:xfrm>
-      </p:grpSpPr>
-      <p:sp>
-        <p:nvSpPr>
-          <p:cNvPr id="2" name="Title 1"/>
-          <p:cNvSpPr>
-            <a:spLocks noGrp="1"/>
-          </p:cNvSpPr>
-          <p:nvPr>
-            <p:ph type="title"/>
-          </p:nvPr>
-        </p:nvSpPr>
-        <p:spPr/>
-        <p:txBody>
-          <a:bodyPr/>
-          <a:lstStyle/>
-          <a:p>
-            <a:r>
-              <a:rPr lang="en-US" dirty="0" smtClean="0"/>
-              <a:t>Variables taken into consideration</a:t>
-            </a:r>
-            <a:endParaRPr lang="en-US" dirty="0"/>
-          </a:p>
-        </p:txBody>
-      </p:sp>
-      <p:sp>
-        <p:nvSpPr>
-          <p:cNvPr id="3" name="Content Placeholder 2"/>
-          <p:cNvSpPr>
-            <a:spLocks noGrp="1"/>
-          </p:cNvSpPr>
-          <p:nvPr>
-            <p:ph sz="quarter" idx="13"/>
-          </p:nvPr>
-        </p:nvSpPr>
-        <p:spPr/>
-        <p:txBody>
-          <a:bodyPr/>
-          <a:lstStyle/>
-          <a:p>
-            <a:r>
-              <a:rPr lang="en-US" dirty="0" smtClean="0"/>
-              <a:t>Sex</a:t>
-            </a:r>
-          </a:p>
-          <a:p>
-            <a:r>
-              <a:rPr lang="en-US" dirty="0" err="1" smtClean="0"/>
-              <a:t>Multipleoffenses</a:t>
-            </a:r>
-            <a:r>
-              <a:rPr lang="en-US" dirty="0" smtClean="0"/>
-              <a:t> (Boolean value)</a:t>
-            </a:r>
-          </a:p>
-          <a:p>
-            <a:r>
-              <a:rPr lang="en-US" dirty="0" smtClean="0"/>
-              <a:t>Violator</a:t>
-            </a:r>
-          </a:p>
-          <a:p>
-            <a:endParaRPr lang="en-US" dirty="0"/>
-          </a:p>
-          <a:p>
-            <a:pPr marL="0" indent="0">
-              <a:buNone/>
-            </a:pPr>
-            <a:r>
-              <a:rPr lang="en-US" dirty="0" smtClean="0"/>
-              <a:t>Data Ignored:</a:t>
-            </a:r>
-          </a:p>
-          <a:p>
-            <a:pPr marL="0" indent="0">
-              <a:buNone/>
-            </a:pPr>
-            <a:r>
-              <a:rPr lang="en-US" dirty="0" smtClean="0"/>
-              <a:t>Race, age, state, </a:t>
-            </a:r>
-            <a:r>
-              <a:rPr lang="en-US" dirty="0" err="1" smtClean="0"/>
-              <a:t>timeserved</a:t>
-            </a:r>
-            <a:r>
-              <a:rPr lang="en-US" dirty="0" smtClean="0"/>
-              <a:t>, crimes, </a:t>
-            </a:r>
-            <a:r>
-              <a:rPr lang="en-US" dirty="0" err="1" smtClean="0"/>
-              <a:t>maxsenteces</a:t>
-            </a:r>
-            <a:endParaRPr lang="en-US" dirty="0"/>
-          </a:p>
-        </p:txBody>
-      </p:sp>
-    </p:spTree>
-    <p:extLst>
-      <p:ext uri="{BB962C8B-B14F-4D97-AF65-F5344CB8AC3E}">
-        <p14:creationId xmlns:p14="http://schemas.microsoft.com/office/powerpoint/2010/main" val="222235038"/>
-      </p:ext>
-    </p:extLst>
-  </p:cSld>
-  <p:clrMapOvr>
-    <a:masterClrMapping/>
-  </p:clrMapOvr>
-</p:sld>
-</file>
-
-<file path=ppt/slides/slide6.xml><?xml version="1.0" encoding="utf-8"?>
-<p:sld xmlns:a="http://schemas.openxmlformats.org/drawingml/2006/main" xmlns:r="http://schemas.openxmlformats.org/officeDocument/2006/relationships" xmlns:p="http://schemas.openxmlformats.org/presentationml/2006/main">
-  <p:cSld>
-    <p:spTree>
-      <p:nvGrpSpPr>
-        <p:cNvPr id="1" name=""/>
-        <p:cNvGrpSpPr/>
-        <p:nvPr/>
-      </p:nvGrpSpPr>
-      <p:grpSpPr>
-        <a:xfrm>
-          <a:off x="0" y="0"/>
-          <a:ext cx="0" cy="0"/>
-          <a:chOff x="0" y="0"/>
-          <a:chExt cx="0" cy="0"/>
-        </a:xfrm>
-      </p:grpSpPr>
-      <p:sp>
-        <p:nvSpPr>
-          <p:cNvPr id="2" name="Title 1"/>
-          <p:cNvSpPr>
-            <a:spLocks noGrp="1"/>
-          </p:cNvSpPr>
-          <p:nvPr>
-            <p:ph type="title"/>
-          </p:nvPr>
-        </p:nvSpPr>
-        <p:spPr/>
-        <p:txBody>
-          <a:bodyPr/>
-          <a:lstStyle/>
-          <a:p>
-            <a:r>
-              <a:rPr lang="en-US" dirty="0" smtClean="0"/>
-              <a:t>Process</a:t>
-            </a:r>
-            <a:endParaRPr lang="en-US" dirty="0"/>
-          </a:p>
-        </p:txBody>
-      </p:sp>
-      <p:sp>
-        <p:nvSpPr>
-          <p:cNvPr id="3" name="Content Placeholder 2"/>
-          <p:cNvSpPr>
-            <a:spLocks noGrp="1"/>
-          </p:cNvSpPr>
-          <p:nvPr>
-            <p:ph sz="quarter" idx="13"/>
-          </p:nvPr>
-        </p:nvSpPr>
-        <p:spPr/>
-        <p:txBody>
-          <a:bodyPr/>
-          <a:lstStyle/>
-          <a:p>
-            <a:r>
-              <a:rPr lang="en-US" dirty="0" smtClean="0"/>
-              <a:t>Taken 409 instances out of 675 sample and used logistic regression on these instances</a:t>
-            </a:r>
-          </a:p>
-          <a:p>
-            <a:r>
-              <a:rPr lang="en-US" dirty="0" smtClean="0"/>
-              <a:t>Taken another 409 samples randomly from 675 samples and used them as test sample</a:t>
-            </a:r>
-            <a:endParaRPr lang="en-US" dirty="0"/>
-          </a:p>
-        </p:txBody>
-      </p:sp>
-    </p:spTree>
-    <p:extLst>
-      <p:ext uri="{BB962C8B-B14F-4D97-AF65-F5344CB8AC3E}">
-        <p14:creationId xmlns:p14="http://schemas.microsoft.com/office/powerpoint/2010/main" val="129238832"/>
-      </p:ext>
-    </p:extLst>
-  </p:cSld>
-  <p:clrMapOvr>
-    <a:masterClrMapping/>
-  </p:clrMapOvr>
-</p:sld>
-</file>
-
-<file path=ppt/slides/slide7.xml><?xml version="1.0" encoding="utf-8"?>
-<p:sld xmlns:a="http://schemas.openxmlformats.org/drawingml/2006/main" xmlns:r="http://schemas.openxmlformats.org/officeDocument/2006/relationships" xmlns:p="http://schemas.openxmlformats.org/presentationml/2006/main">
-  <p:cSld>
-    <p:spTree>
-      <p:nvGrpSpPr>
-        <p:cNvPr id="1" name=""/>
-        <p:cNvGrpSpPr/>
-        <p:nvPr/>
-      </p:nvGrpSpPr>
-      <p:grpSpPr>
-        <a:xfrm>
-          <a:off x="0" y="0"/>
-          <a:ext cx="0" cy="0"/>
-          <a:chOff x="0" y="0"/>
-          <a:chExt cx="0" cy="0"/>
-        </a:xfrm>
-      </p:grpSpPr>
-      <p:sp>
-        <p:nvSpPr>
-          <p:cNvPr id="2" name="Title 1"/>
-          <p:cNvSpPr>
-            <a:spLocks noGrp="1"/>
-          </p:cNvSpPr>
-          <p:nvPr>
-            <p:ph type="title"/>
-          </p:nvPr>
-        </p:nvSpPr>
-        <p:spPr/>
-        <p:txBody>
-          <a:bodyPr/>
-          <a:lstStyle/>
-          <a:p>
-            <a:r>
-              <a:rPr lang="en-US" dirty="0" smtClean="0"/>
-              <a:t>Result</a:t>
-            </a:r>
-            <a:endParaRPr lang="en-US" dirty="0"/>
-          </a:p>
-        </p:txBody>
-      </p:sp>
-      <p:sp>
-        <p:nvSpPr>
-          <p:cNvPr id="8" name="Content Placeholder 7"/>
-          <p:cNvSpPr>
-            <a:spLocks noGrp="1"/>
-          </p:cNvSpPr>
-          <p:nvPr>
-            <p:ph sz="quarter" idx="13"/>
-          </p:nvPr>
-        </p:nvSpPr>
-        <p:spPr/>
-        <p:txBody>
-          <a:bodyPr/>
-          <a:lstStyle/>
-          <a:p>
-            <a:r>
-              <a:rPr lang="en-US" dirty="0" smtClean="0"/>
-              <a:t>88% accuracy. </a:t>
+              <a:t>% accuracy. </a:t>
             </a:r>
           </a:p>
           <a:p>
@@ -6842,8 +6826,8 @@
         </p:blipFill>
         <p:spPr>
           <a:xfrm>
-            <a:off x="1104231" y="2815495"/>
-            <a:ext cx="7721600" cy="2527300"/>
+            <a:off x="1362729" y="3770722"/>
+            <a:ext cx="6612871" cy="2164410"/>
           </a:xfrm>
           <a:prstGeom prst="rect">
             <a:avLst/>
@@ -6854,6 +6838,1155 @@
     <p:extLst>
       <p:ext uri="{BB962C8B-B14F-4D97-AF65-F5344CB8AC3E}">
         <p14:creationId xmlns:p14="http://schemas.microsoft.com/office/powerpoint/2010/main" val="861946264"/>
+      </p:ext>
+    </p:extLst>
+  </p:cSld>
+  <p:clrMapOvr>
+    <a:masterClrMapping/>
+  </p:clrMapOvr>
+</p:sld>
+</file>
+
+<file path=ppt/slides/slide11.xml><?xml version="1.0" encoding="utf-8"?>
+<p:sld xmlns:a="http://schemas.openxmlformats.org/drawingml/2006/main" xmlns:r="http://schemas.openxmlformats.org/officeDocument/2006/relationships" xmlns:p="http://schemas.openxmlformats.org/presentationml/2006/main">
+  <p:cSld>
+    <p:bg>
+      <p:bgPr>
+        <a:solidFill>
+          <a:schemeClr val="accent4"/>
+        </a:solidFill>
+        <a:effectLst/>
+      </p:bgPr>
+    </p:bg>
+    <p:spTree>
+      <p:nvGrpSpPr>
+        <p:cNvPr id="1" name=""/>
+        <p:cNvGrpSpPr/>
+        <p:nvPr/>
+      </p:nvGrpSpPr>
+      <p:grpSpPr>
+        <a:xfrm>
+          <a:off x="0" y="0"/>
+          <a:ext cx="0" cy="0"/>
+          <a:chOff x="0" y="0"/>
+          <a:chExt cx="0" cy="0"/>
+        </a:xfrm>
+      </p:grpSpPr>
+      <p:sp>
+        <p:nvSpPr>
+          <p:cNvPr id="2" name="Title 1"/>
+          <p:cNvSpPr>
+            <a:spLocks noGrp="1"/>
+          </p:cNvSpPr>
+          <p:nvPr>
+            <p:ph type="title"/>
+          </p:nvPr>
+        </p:nvSpPr>
+        <p:spPr/>
+        <p:txBody>
+          <a:bodyPr/>
+          <a:lstStyle/>
+          <a:p>
+            <a:r>
+              <a:rPr lang="en-US" dirty="0" smtClean="0"/>
+              <a:t>Thank you</a:t>
+            </a:r>
+            <a:endParaRPr lang="en-US" dirty="0"/>
+          </a:p>
+        </p:txBody>
+      </p:sp>
+      <p:pic>
+        <p:nvPicPr>
+          <p:cNvPr id="4" name="Content Placeholder 3"/>
+          <p:cNvPicPr>
+            <a:picLocks noGrp="1" noChangeAspect="1"/>
+          </p:cNvPicPr>
+          <p:nvPr>
+            <p:ph sz="quarter" idx="13"/>
+          </p:nvPr>
+        </p:nvPicPr>
+        <p:blipFill>
+          <a:blip r:embed="rId2">
+            <a:extLst>
+              <a:ext uri="{28A0092B-C50C-407E-A947-70E740481C1C}">
+                <a14:useLocalDpi xmlns:a14="http://schemas.microsoft.com/office/drawing/2010/main" val="0"/>
+              </a:ext>
+            </a:extLst>
+          </a:blip>
+          <a:stretch>
+            <a:fillRect/>
+          </a:stretch>
+        </p:blipFill>
+        <p:spPr>
+          <a:xfrm>
+            <a:off x="2712747" y="2017336"/>
+            <a:ext cx="4339853" cy="2795673"/>
+          </a:xfrm>
+        </p:spPr>
+      </p:pic>
+    </p:spTree>
+    <p:extLst>
+      <p:ext uri="{BB962C8B-B14F-4D97-AF65-F5344CB8AC3E}">
+        <p14:creationId xmlns:p14="http://schemas.microsoft.com/office/powerpoint/2010/main" val="1561143352"/>
+      </p:ext>
+    </p:extLst>
+  </p:cSld>
+  <p:clrMapOvr>
+    <a:masterClrMapping/>
+  </p:clrMapOvr>
+</p:sld>
+</file>
+
+<file path=ppt/slides/slide2.xml><?xml version="1.0" encoding="utf-8"?>
+<p:sld xmlns:a="http://schemas.openxmlformats.org/drawingml/2006/main" xmlns:r="http://schemas.openxmlformats.org/officeDocument/2006/relationships" xmlns:p="http://schemas.openxmlformats.org/presentationml/2006/main">
+  <p:cSld>
+    <p:bg>
+      <p:bgPr>
+        <a:solidFill>
+          <a:schemeClr val="accent4">
+            <a:lumMod val="75000"/>
+          </a:schemeClr>
+        </a:solidFill>
+        <a:effectLst/>
+      </p:bgPr>
+    </p:bg>
+    <p:spTree>
+      <p:nvGrpSpPr>
+        <p:cNvPr id="1" name=""/>
+        <p:cNvGrpSpPr/>
+        <p:nvPr/>
+      </p:nvGrpSpPr>
+      <p:grpSpPr>
+        <a:xfrm>
+          <a:off x="0" y="0"/>
+          <a:ext cx="0" cy="0"/>
+          <a:chOff x="0" y="0"/>
+          <a:chExt cx="0" cy="0"/>
+        </a:xfrm>
+      </p:grpSpPr>
+      <p:sp>
+        <p:nvSpPr>
+          <p:cNvPr id="2" name="Title 1"/>
+          <p:cNvSpPr>
+            <a:spLocks noGrp="1"/>
+          </p:cNvSpPr>
+          <p:nvPr>
+            <p:ph type="title"/>
+          </p:nvPr>
+        </p:nvSpPr>
+        <p:spPr/>
+        <p:txBody>
+          <a:bodyPr/>
+          <a:lstStyle/>
+          <a:p>
+            <a:r>
+              <a:rPr lang="en-US" dirty="0" smtClean="0"/>
+              <a:t>What is parole violation</a:t>
+            </a:r>
+            <a:endParaRPr lang="en-US" dirty="0"/>
+          </a:p>
+        </p:txBody>
+      </p:sp>
+      <p:pic>
+        <p:nvPicPr>
+          <p:cNvPr id="4" name="Content Placeholder 3"/>
+          <p:cNvPicPr>
+            <a:picLocks noGrp="1" noChangeAspect="1"/>
+          </p:cNvPicPr>
+          <p:nvPr>
+            <p:ph sz="quarter" idx="13"/>
+          </p:nvPr>
+        </p:nvPicPr>
+        <p:blipFill>
+          <a:blip r:embed="rId2">
+            <a:extLst>
+              <a:ext uri="{28A0092B-C50C-407E-A947-70E740481C1C}">
+                <a14:useLocalDpi xmlns:a14="http://schemas.microsoft.com/office/drawing/2010/main" val="0"/>
+              </a:ext>
+            </a:extLst>
+          </a:blip>
+          <a:stretch>
+            <a:fillRect/>
+          </a:stretch>
+        </p:blipFill>
+        <p:spPr>
+          <a:xfrm>
+            <a:off x="1085851" y="3633337"/>
+            <a:ext cx="6972300" cy="1739900"/>
+          </a:xfrm>
+        </p:spPr>
+      </p:pic>
+      <p:sp>
+        <p:nvSpPr>
+          <p:cNvPr id="6" name="TextBox 5"/>
+          <p:cNvSpPr txBox="1"/>
+          <p:nvPr/>
+        </p:nvSpPr>
+        <p:spPr>
+          <a:xfrm>
+            <a:off x="1421091" y="2921720"/>
+            <a:ext cx="1998560" cy="300082"/>
+          </a:xfrm>
+          <a:prstGeom prst="rect">
+            <a:avLst/>
+          </a:prstGeom>
+          <a:noFill/>
+        </p:spPr>
+        <p:txBody>
+          <a:bodyPr wrap="none" rtlCol="0">
+            <a:spAutoFit/>
+          </a:bodyPr>
+          <a:lstStyle/>
+          <a:p>
+            <a:r>
+              <a:rPr lang="en-US" sz="1350" dirty="0"/>
+              <a:t>Taken from Google Search</a:t>
+            </a:r>
+          </a:p>
+        </p:txBody>
+      </p:sp>
+    </p:spTree>
+    <p:extLst>
+      <p:ext uri="{BB962C8B-B14F-4D97-AF65-F5344CB8AC3E}">
+        <p14:creationId xmlns:p14="http://schemas.microsoft.com/office/powerpoint/2010/main" val="1776401674"/>
+      </p:ext>
+    </p:extLst>
+  </p:cSld>
+  <p:clrMapOvr>
+    <a:masterClrMapping/>
+  </p:clrMapOvr>
+</p:sld>
+</file>
+
+<file path=ppt/slides/slide3.xml><?xml version="1.0" encoding="utf-8"?>
+<p:sld xmlns:a="http://schemas.openxmlformats.org/drawingml/2006/main" xmlns:r="http://schemas.openxmlformats.org/officeDocument/2006/relationships" xmlns:p="http://schemas.openxmlformats.org/presentationml/2006/main">
+  <p:cSld>
+    <p:bg>
+      <p:bgPr>
+        <a:gradFill flip="none" rotWithShape="1">
+          <a:gsLst>
+            <a:gs pos="0">
+              <a:schemeClr val="accent4">
+                <a:lumMod val="67000"/>
+              </a:schemeClr>
+            </a:gs>
+            <a:gs pos="48000">
+              <a:schemeClr val="accent4">
+                <a:lumMod val="97000"/>
+                <a:lumOff val="3000"/>
+              </a:schemeClr>
+            </a:gs>
+            <a:gs pos="100000">
+              <a:schemeClr val="accent4">
+                <a:lumMod val="60000"/>
+                <a:lumOff val="40000"/>
+              </a:schemeClr>
+            </a:gs>
+          </a:gsLst>
+          <a:lin ang="16200000" scaled="1"/>
+          <a:tileRect/>
+        </a:gradFill>
+        <a:effectLst/>
+      </p:bgPr>
+    </p:bg>
+    <p:spTree>
+      <p:nvGrpSpPr>
+        <p:cNvPr id="1" name=""/>
+        <p:cNvGrpSpPr/>
+        <p:nvPr/>
+      </p:nvGrpSpPr>
+      <p:grpSpPr>
+        <a:xfrm>
+          <a:off x="0" y="0"/>
+          <a:ext cx="0" cy="0"/>
+          <a:chOff x="0" y="0"/>
+          <a:chExt cx="0" cy="0"/>
+        </a:xfrm>
+      </p:grpSpPr>
+      <p:sp>
+        <p:nvSpPr>
+          <p:cNvPr id="2" name="Title 1"/>
+          <p:cNvSpPr>
+            <a:spLocks noGrp="1"/>
+          </p:cNvSpPr>
+          <p:nvPr>
+            <p:ph type="title"/>
+          </p:nvPr>
+        </p:nvSpPr>
+        <p:spPr/>
+        <p:txBody>
+          <a:bodyPr/>
+          <a:lstStyle/>
+          <a:p>
+            <a:r>
+              <a:rPr lang="en-US" dirty="0" smtClean="0"/>
+              <a:t>Dataset Taken FROM</a:t>
+            </a:r>
+            <a:endParaRPr lang="en-US" dirty="0"/>
+          </a:p>
+        </p:txBody>
+      </p:sp>
+      <p:sp>
+        <p:nvSpPr>
+          <p:cNvPr id="3" name="Content Placeholder 2"/>
+          <p:cNvSpPr>
+            <a:spLocks noGrp="1"/>
+          </p:cNvSpPr>
+          <p:nvPr>
+            <p:ph sz="quarter" idx="13"/>
+          </p:nvPr>
+        </p:nvSpPr>
+        <p:spPr/>
+        <p:txBody>
+          <a:bodyPr/>
+          <a:lstStyle/>
+          <a:p>
+            <a:pPr marL="0" indent="0">
+              <a:buNone/>
+            </a:pPr>
+            <a:r>
+              <a:rPr lang="en-US" dirty="0" smtClean="0"/>
+              <a:t> </a:t>
+            </a:r>
+            <a:endParaRPr lang="en-US" dirty="0"/>
+          </a:p>
+          <a:p>
+            <a:r>
+              <a:rPr lang="en-US" dirty="0" smtClean="0">
+                <a:hlinkClick r:id="rId2"/>
+              </a:rPr>
+              <a:t>https</a:t>
+            </a:r>
+            <a:r>
+              <a:rPr lang="en-US" dirty="0">
+                <a:hlinkClick r:id="rId2"/>
+              </a:rPr>
+              <a:t>://</a:t>
+            </a:r>
+            <a:r>
+              <a:rPr lang="en-US" dirty="0" smtClean="0">
+                <a:hlinkClick r:id="rId2"/>
+              </a:rPr>
+              <a:t>github.com/chicheongweng/MITx-15.071x-The-Analytics-Edge/blob/master/data/parole.csv</a:t>
+            </a:r>
+            <a:endParaRPr lang="en-US" dirty="0" smtClean="0"/>
+          </a:p>
+          <a:p>
+            <a:endParaRPr lang="en-US" dirty="0"/>
+          </a:p>
+          <a:p>
+            <a:r>
+              <a:rPr lang="en-US" dirty="0" smtClean="0"/>
+              <a:t>Used 409 </a:t>
+            </a:r>
+            <a:r>
+              <a:rPr lang="en-US" dirty="0" err="1" smtClean="0"/>
+              <a:t>instaces</a:t>
+            </a:r>
+            <a:r>
+              <a:rPr lang="en-US" dirty="0" smtClean="0"/>
+              <a:t> out of 675 available</a:t>
+            </a:r>
+          </a:p>
+          <a:p>
+            <a:pPr marL="0" indent="0">
+              <a:buNone/>
+            </a:pPr>
+            <a:endParaRPr lang="en-US" dirty="0"/>
+          </a:p>
+        </p:txBody>
+      </p:sp>
+    </p:spTree>
+    <p:extLst>
+      <p:ext uri="{BB962C8B-B14F-4D97-AF65-F5344CB8AC3E}">
+        <p14:creationId xmlns:p14="http://schemas.microsoft.com/office/powerpoint/2010/main" val="604148373"/>
+      </p:ext>
+    </p:extLst>
+  </p:cSld>
+  <p:clrMapOvr>
+    <a:masterClrMapping/>
+  </p:clrMapOvr>
+</p:sld>
+</file>
+
+<file path=ppt/slides/slide4.xml><?xml version="1.0" encoding="utf-8"?>
+<p:sld xmlns:a="http://schemas.openxmlformats.org/drawingml/2006/main" xmlns:r="http://schemas.openxmlformats.org/officeDocument/2006/relationships" xmlns:p="http://schemas.openxmlformats.org/presentationml/2006/main">
+  <p:cSld>
+    <p:bg>
+      <p:bgPr>
+        <a:gradFill flip="none" rotWithShape="1">
+          <a:gsLst>
+            <a:gs pos="0">
+              <a:schemeClr val="accent4">
+                <a:lumMod val="40000"/>
+                <a:lumOff val="60000"/>
+              </a:schemeClr>
+            </a:gs>
+            <a:gs pos="46000">
+              <a:schemeClr val="accent4">
+                <a:lumMod val="95000"/>
+                <a:lumOff val="5000"/>
+              </a:schemeClr>
+            </a:gs>
+            <a:gs pos="100000">
+              <a:schemeClr val="accent4">
+                <a:lumMod val="60000"/>
+              </a:schemeClr>
+            </a:gs>
+          </a:gsLst>
+          <a:path path="circle">
+            <a:fillToRect l="50000" t="130000" r="50000" b="-30000"/>
+          </a:path>
+          <a:tileRect/>
+        </a:gradFill>
+        <a:effectLst/>
+      </p:bgPr>
+    </p:bg>
+    <p:spTree>
+      <p:nvGrpSpPr>
+        <p:cNvPr id="1" name=""/>
+        <p:cNvGrpSpPr/>
+        <p:nvPr/>
+      </p:nvGrpSpPr>
+      <p:grpSpPr>
+        <a:xfrm>
+          <a:off x="0" y="0"/>
+          <a:ext cx="0" cy="0"/>
+          <a:chOff x="0" y="0"/>
+          <a:chExt cx="0" cy="0"/>
+        </a:xfrm>
+      </p:grpSpPr>
+      <p:sp>
+        <p:nvSpPr>
+          <p:cNvPr id="2" name="Title 1"/>
+          <p:cNvSpPr>
+            <a:spLocks noGrp="1"/>
+          </p:cNvSpPr>
+          <p:nvPr>
+            <p:ph type="title"/>
+          </p:nvPr>
+        </p:nvSpPr>
+        <p:spPr/>
+        <p:txBody>
+          <a:bodyPr/>
+          <a:lstStyle/>
+          <a:p>
+            <a:r>
+              <a:rPr lang="en-US" dirty="0" smtClean="0"/>
+              <a:t>Parole violation dataset</a:t>
+            </a:r>
+            <a:endParaRPr lang="en-US" dirty="0"/>
+          </a:p>
+        </p:txBody>
+      </p:sp>
+      <p:pic>
+        <p:nvPicPr>
+          <p:cNvPr id="4" name="Content Placeholder 3"/>
+          <p:cNvPicPr>
+            <a:picLocks noGrp="1" noChangeAspect="1"/>
+          </p:cNvPicPr>
+          <p:nvPr>
+            <p:ph sz="quarter" idx="13"/>
+          </p:nvPr>
+        </p:nvPicPr>
+        <p:blipFill>
+          <a:blip r:embed="rId2">
+            <a:extLst>
+              <a:ext uri="{28A0092B-C50C-407E-A947-70E740481C1C}">
+                <a14:useLocalDpi xmlns:a14="http://schemas.microsoft.com/office/drawing/2010/main" val="0"/>
+              </a:ext>
+            </a:extLst>
+          </a:blip>
+          <a:stretch>
+            <a:fillRect/>
+          </a:stretch>
+        </p:blipFill>
+        <p:spPr>
+          <a:xfrm>
+            <a:off x="1735968" y="2121031"/>
+            <a:ext cx="5672066" cy="3783291"/>
+          </a:xfrm>
+        </p:spPr>
+      </p:pic>
+    </p:spTree>
+    <p:extLst>
+      <p:ext uri="{BB962C8B-B14F-4D97-AF65-F5344CB8AC3E}">
+        <p14:creationId xmlns:p14="http://schemas.microsoft.com/office/powerpoint/2010/main" val="743958127"/>
+      </p:ext>
+    </p:extLst>
+  </p:cSld>
+  <p:clrMapOvr>
+    <a:masterClrMapping/>
+  </p:clrMapOvr>
+</p:sld>
+</file>
+
+<file path=ppt/slides/slide5.xml><?xml version="1.0" encoding="utf-8"?>
+<p:sld xmlns:a="http://schemas.openxmlformats.org/drawingml/2006/main" xmlns:r="http://schemas.openxmlformats.org/officeDocument/2006/relationships" xmlns:p="http://schemas.openxmlformats.org/presentationml/2006/main">
+  <p:cSld>
+    <p:bg>
+      <p:bgPr>
+        <a:gradFill flip="none" rotWithShape="1">
+          <a:gsLst>
+            <a:gs pos="0">
+              <a:schemeClr val="accent4">
+                <a:lumMod val="67000"/>
+              </a:schemeClr>
+            </a:gs>
+            <a:gs pos="48000">
+              <a:schemeClr val="accent4">
+                <a:lumMod val="97000"/>
+                <a:lumOff val="3000"/>
+              </a:schemeClr>
+            </a:gs>
+            <a:gs pos="100000">
+              <a:schemeClr val="accent4">
+                <a:lumMod val="60000"/>
+                <a:lumOff val="40000"/>
+              </a:schemeClr>
+            </a:gs>
+          </a:gsLst>
+          <a:lin ang="16200000" scaled="1"/>
+          <a:tileRect/>
+        </a:gradFill>
+        <a:effectLst/>
+      </p:bgPr>
+    </p:bg>
+    <p:spTree>
+      <p:nvGrpSpPr>
+        <p:cNvPr id="1" name=""/>
+        <p:cNvGrpSpPr/>
+        <p:nvPr/>
+      </p:nvGrpSpPr>
+      <p:grpSpPr>
+        <a:xfrm>
+          <a:off x="0" y="0"/>
+          <a:ext cx="0" cy="0"/>
+          <a:chOff x="0" y="0"/>
+          <a:chExt cx="0" cy="0"/>
+        </a:xfrm>
+      </p:grpSpPr>
+      <p:sp>
+        <p:nvSpPr>
+          <p:cNvPr id="2" name="Title 1"/>
+          <p:cNvSpPr>
+            <a:spLocks noGrp="1"/>
+          </p:cNvSpPr>
+          <p:nvPr>
+            <p:ph type="title"/>
+          </p:nvPr>
+        </p:nvSpPr>
+        <p:spPr/>
+        <p:txBody>
+          <a:bodyPr/>
+          <a:lstStyle/>
+          <a:p>
+            <a:r>
+              <a:rPr lang="en-US" dirty="0" smtClean="0"/>
+              <a:t>Libraries Used</a:t>
+            </a:r>
+            <a:endParaRPr lang="en-US" dirty="0"/>
+          </a:p>
+        </p:txBody>
+      </p:sp>
+      <p:sp>
+        <p:nvSpPr>
+          <p:cNvPr id="3" name="Content Placeholder 2"/>
+          <p:cNvSpPr>
+            <a:spLocks noGrp="1"/>
+          </p:cNvSpPr>
+          <p:nvPr>
+            <p:ph sz="quarter" idx="13"/>
+          </p:nvPr>
+        </p:nvSpPr>
+        <p:spPr/>
+        <p:txBody>
+          <a:bodyPr/>
+          <a:lstStyle/>
+          <a:p>
+            <a:r>
+              <a:rPr lang="en-US" dirty="0" err="1" smtClean="0"/>
+              <a:t>NUMPy</a:t>
+            </a:r>
+            <a:endParaRPr lang="en-US" dirty="0" smtClean="0"/>
+          </a:p>
+          <a:p>
+            <a:r>
+              <a:rPr lang="en-US" dirty="0" smtClean="0"/>
+              <a:t>SCIPY</a:t>
+            </a:r>
+          </a:p>
+          <a:p>
+            <a:r>
+              <a:rPr lang="en-US" dirty="0" err="1" smtClean="0"/>
+              <a:t>Sklearn</a:t>
+            </a:r>
+            <a:endParaRPr lang="en-US" dirty="0" smtClean="0"/>
+          </a:p>
+          <a:p>
+            <a:pPr marL="0" indent="0">
+              <a:buNone/>
+            </a:pPr>
+            <a:endParaRPr lang="en-US" dirty="0"/>
+          </a:p>
+        </p:txBody>
+      </p:sp>
+      <p:pic>
+        <p:nvPicPr>
+          <p:cNvPr id="4" name="Picture 3"/>
+          <p:cNvPicPr>
+            <a:picLocks noChangeAspect="1"/>
+          </p:cNvPicPr>
+          <p:nvPr/>
+        </p:nvPicPr>
+        <p:blipFill>
+          <a:blip r:embed="rId2">
+            <a:extLst>
+              <a:ext uri="{28A0092B-C50C-407E-A947-70E740481C1C}">
+                <a14:useLocalDpi xmlns:a14="http://schemas.microsoft.com/office/drawing/2010/main" val="0"/>
+              </a:ext>
+            </a:extLst>
+          </a:blip>
+          <a:stretch>
+            <a:fillRect/>
+          </a:stretch>
+        </p:blipFill>
+        <p:spPr>
+          <a:xfrm>
+            <a:off x="1496035" y="4212633"/>
+            <a:ext cx="5171041" cy="1163554"/>
+          </a:xfrm>
+          <a:prstGeom prst="rect">
+            <a:avLst/>
+          </a:prstGeom>
+        </p:spPr>
+      </p:pic>
+    </p:spTree>
+    <p:extLst>
+      <p:ext uri="{BB962C8B-B14F-4D97-AF65-F5344CB8AC3E}">
+        <p14:creationId xmlns:p14="http://schemas.microsoft.com/office/powerpoint/2010/main" val="1467733893"/>
+      </p:ext>
+    </p:extLst>
+  </p:cSld>
+  <p:clrMapOvr>
+    <a:masterClrMapping/>
+  </p:clrMapOvr>
+</p:sld>
+</file>
+
+<file path=ppt/slides/slide6.xml><?xml version="1.0" encoding="utf-8"?>
+<p:sld xmlns:a="http://schemas.openxmlformats.org/drawingml/2006/main" xmlns:r="http://schemas.openxmlformats.org/officeDocument/2006/relationships" xmlns:p="http://schemas.openxmlformats.org/presentationml/2006/main">
+  <p:cSld>
+    <p:bg>
+      <p:bgPr>
+        <a:gradFill flip="none" rotWithShape="1">
+          <a:gsLst>
+            <a:gs pos="0">
+              <a:schemeClr val="accent4">
+                <a:lumMod val="67000"/>
+              </a:schemeClr>
+            </a:gs>
+            <a:gs pos="48000">
+              <a:schemeClr val="accent4">
+                <a:lumMod val="97000"/>
+                <a:lumOff val="3000"/>
+              </a:schemeClr>
+            </a:gs>
+            <a:gs pos="100000">
+              <a:schemeClr val="accent4">
+                <a:lumMod val="60000"/>
+                <a:lumOff val="40000"/>
+              </a:schemeClr>
+            </a:gs>
+          </a:gsLst>
+          <a:lin ang="16200000" scaled="1"/>
+          <a:tileRect/>
+        </a:gradFill>
+        <a:effectLst/>
+      </p:bgPr>
+    </p:bg>
+    <p:spTree>
+      <p:nvGrpSpPr>
+        <p:cNvPr id="1" name=""/>
+        <p:cNvGrpSpPr/>
+        <p:nvPr/>
+      </p:nvGrpSpPr>
+      <p:grpSpPr>
+        <a:xfrm>
+          <a:off x="0" y="0"/>
+          <a:ext cx="0" cy="0"/>
+          <a:chOff x="0" y="0"/>
+          <a:chExt cx="0" cy="0"/>
+        </a:xfrm>
+      </p:grpSpPr>
+      <p:sp>
+        <p:nvSpPr>
+          <p:cNvPr id="2" name="Title 1"/>
+          <p:cNvSpPr>
+            <a:spLocks noGrp="1"/>
+          </p:cNvSpPr>
+          <p:nvPr>
+            <p:ph type="title"/>
+          </p:nvPr>
+        </p:nvSpPr>
+        <p:spPr/>
+        <p:txBody>
+          <a:bodyPr>
+            <a:normAutofit/>
+          </a:bodyPr>
+          <a:lstStyle/>
+          <a:p>
+            <a:r>
+              <a:rPr lang="en-US" dirty="0" smtClean="0"/>
+              <a:t>Variables taken into consideration</a:t>
+            </a:r>
+            <a:endParaRPr lang="en-US" dirty="0"/>
+          </a:p>
+        </p:txBody>
+      </p:sp>
+      <p:sp>
+        <p:nvSpPr>
+          <p:cNvPr id="3" name="Content Placeholder 2"/>
+          <p:cNvSpPr>
+            <a:spLocks noGrp="1"/>
+          </p:cNvSpPr>
+          <p:nvPr>
+            <p:ph sz="quarter" idx="13"/>
+          </p:nvPr>
+        </p:nvSpPr>
+        <p:spPr/>
+        <p:txBody>
+          <a:bodyPr/>
+          <a:lstStyle/>
+          <a:p>
+            <a:r>
+              <a:rPr lang="en-US" dirty="0" smtClean="0"/>
+              <a:t>Sex</a:t>
+            </a:r>
+          </a:p>
+          <a:p>
+            <a:r>
+              <a:rPr lang="en-US" dirty="0" err="1" smtClean="0"/>
+              <a:t>Multipleoffenses</a:t>
+            </a:r>
+            <a:r>
+              <a:rPr lang="en-US" dirty="0" smtClean="0"/>
+              <a:t> (Boolean value)</a:t>
+            </a:r>
+          </a:p>
+          <a:p>
+            <a:r>
+              <a:rPr lang="en-US" dirty="0" smtClean="0"/>
+              <a:t>Violator</a:t>
+            </a:r>
+          </a:p>
+          <a:p>
+            <a:endParaRPr lang="en-US" dirty="0"/>
+          </a:p>
+          <a:p>
+            <a:pPr marL="0" indent="0">
+              <a:buNone/>
+            </a:pPr>
+            <a:r>
+              <a:rPr lang="en-US" dirty="0" smtClean="0"/>
+              <a:t>Data Ignored:</a:t>
+            </a:r>
+          </a:p>
+          <a:p>
+            <a:pPr marL="0" indent="0">
+              <a:buNone/>
+            </a:pPr>
+            <a:r>
+              <a:rPr lang="en-US" dirty="0" smtClean="0"/>
+              <a:t>Race, age, state, </a:t>
+            </a:r>
+            <a:r>
+              <a:rPr lang="en-US" dirty="0" err="1" smtClean="0"/>
+              <a:t>timeserved</a:t>
+            </a:r>
+            <a:r>
+              <a:rPr lang="en-US" dirty="0" smtClean="0"/>
+              <a:t>, crimes, </a:t>
+            </a:r>
+            <a:r>
+              <a:rPr lang="en-US" dirty="0" err="1" smtClean="0"/>
+              <a:t>maxsenteces</a:t>
+            </a:r>
+            <a:endParaRPr lang="en-US" dirty="0"/>
+          </a:p>
+        </p:txBody>
+      </p:sp>
+    </p:spTree>
+    <p:extLst>
+      <p:ext uri="{BB962C8B-B14F-4D97-AF65-F5344CB8AC3E}">
+        <p14:creationId xmlns:p14="http://schemas.microsoft.com/office/powerpoint/2010/main" val="222235038"/>
+      </p:ext>
+    </p:extLst>
+  </p:cSld>
+  <p:clrMapOvr>
+    <a:masterClrMapping/>
+  </p:clrMapOvr>
+</p:sld>
+</file>
+
+<file path=ppt/slides/slide7.xml><?xml version="1.0" encoding="utf-8"?>
+<p:sld xmlns:a="http://schemas.openxmlformats.org/drawingml/2006/main" xmlns:r="http://schemas.openxmlformats.org/officeDocument/2006/relationships" xmlns:p="http://schemas.openxmlformats.org/presentationml/2006/main">
+  <p:cSld>
+    <p:bg>
+      <p:bgPr>
+        <a:solidFill>
+          <a:schemeClr val="accent4"/>
+        </a:solidFill>
+        <a:effectLst/>
+      </p:bgPr>
+    </p:bg>
+    <p:spTree>
+      <p:nvGrpSpPr>
+        <p:cNvPr id="1" name=""/>
+        <p:cNvGrpSpPr/>
+        <p:nvPr/>
+      </p:nvGrpSpPr>
+      <p:grpSpPr>
+        <a:xfrm>
+          <a:off x="0" y="0"/>
+          <a:ext cx="0" cy="0"/>
+          <a:chOff x="0" y="0"/>
+          <a:chExt cx="0" cy="0"/>
+        </a:xfrm>
+      </p:grpSpPr>
+      <p:sp>
+        <p:nvSpPr>
+          <p:cNvPr id="2" name="Title 1"/>
+          <p:cNvSpPr>
+            <a:spLocks noGrp="1"/>
+          </p:cNvSpPr>
+          <p:nvPr>
+            <p:ph type="title"/>
+          </p:nvPr>
+        </p:nvSpPr>
+        <p:spPr/>
+        <p:txBody>
+          <a:bodyPr/>
+          <a:lstStyle/>
+          <a:p>
+            <a:r>
+              <a:rPr lang="en-US" dirty="0" smtClean="0"/>
+              <a:t>Process</a:t>
+            </a:r>
+            <a:endParaRPr lang="en-US" dirty="0"/>
+          </a:p>
+        </p:txBody>
+      </p:sp>
+      <p:sp>
+        <p:nvSpPr>
+          <p:cNvPr id="3" name="Content Placeholder 2"/>
+          <p:cNvSpPr>
+            <a:spLocks noGrp="1"/>
+          </p:cNvSpPr>
+          <p:nvPr>
+            <p:ph sz="quarter" idx="13"/>
+          </p:nvPr>
+        </p:nvSpPr>
+        <p:spPr>
+          <a:xfrm>
+            <a:off x="982133" y="1923068"/>
+            <a:ext cx="7704667" cy="4076748"/>
+          </a:xfrm>
+        </p:spPr>
+        <p:txBody>
+          <a:bodyPr/>
+          <a:lstStyle/>
+          <a:p>
+            <a:r>
+              <a:rPr lang="en-US" dirty="0" smtClean="0"/>
+              <a:t>Taken 409 instances out of 675 sample and used logistic regression on these instances</a:t>
+            </a:r>
+          </a:p>
+          <a:p>
+            <a:r>
+              <a:rPr lang="en-US" dirty="0" smtClean="0"/>
+              <a:t>Taken another 409 samples randomly from 675 samples and used them as test </a:t>
+            </a:r>
+            <a:r>
+              <a:rPr lang="en-US" dirty="0" smtClean="0"/>
+              <a:t>sample</a:t>
+            </a:r>
+          </a:p>
+          <a:p>
+            <a:r>
+              <a:rPr lang="en-US" dirty="0" smtClean="0"/>
+              <a:t>No missing values were found</a:t>
+            </a:r>
+          </a:p>
+          <a:p>
+            <a:endParaRPr lang="en-US" dirty="0"/>
+          </a:p>
+        </p:txBody>
+      </p:sp>
+      <p:pic>
+        <p:nvPicPr>
+          <p:cNvPr id="4" name="Picture 3"/>
+          <p:cNvPicPr>
+            <a:picLocks noChangeAspect="1"/>
+          </p:cNvPicPr>
+          <p:nvPr/>
+        </p:nvPicPr>
+        <p:blipFill>
+          <a:blip r:embed="rId3">
+            <a:extLst>
+              <a:ext uri="{28A0092B-C50C-407E-A947-70E740481C1C}">
+                <a14:useLocalDpi xmlns:a14="http://schemas.microsoft.com/office/drawing/2010/main" val="0"/>
+              </a:ext>
+            </a:extLst>
+          </a:blip>
+          <a:stretch>
+            <a:fillRect/>
+          </a:stretch>
+        </p:blipFill>
+        <p:spPr>
+          <a:xfrm>
+            <a:off x="1357560" y="4252813"/>
+            <a:ext cx="4105275" cy="1209675"/>
+          </a:xfrm>
+          <a:prstGeom prst="rect">
+            <a:avLst/>
+          </a:prstGeom>
+        </p:spPr>
+      </p:pic>
+    </p:spTree>
+    <p:extLst>
+      <p:ext uri="{BB962C8B-B14F-4D97-AF65-F5344CB8AC3E}">
+        <p14:creationId xmlns:p14="http://schemas.microsoft.com/office/powerpoint/2010/main" val="129238832"/>
+      </p:ext>
+    </p:extLst>
+  </p:cSld>
+  <p:clrMapOvr>
+    <a:masterClrMapping/>
+  </p:clrMapOvr>
+</p:sld>
+</file>
+
+<file path=ppt/slides/slide8.xml><?xml version="1.0" encoding="utf-8"?>
+<p:sld xmlns:a="http://schemas.openxmlformats.org/drawingml/2006/main" xmlns:r="http://schemas.openxmlformats.org/officeDocument/2006/relationships" xmlns:p="http://schemas.openxmlformats.org/presentationml/2006/main">
+  <p:cSld>
+    <p:bg>
+      <p:bgPr>
+        <a:solidFill>
+          <a:schemeClr val="accent4"/>
+        </a:solidFill>
+        <a:effectLst/>
+      </p:bgPr>
+    </p:bg>
+    <p:spTree>
+      <p:nvGrpSpPr>
+        <p:cNvPr id="1" name=""/>
+        <p:cNvGrpSpPr/>
+        <p:nvPr/>
+      </p:nvGrpSpPr>
+      <p:grpSpPr>
+        <a:xfrm>
+          <a:off x="0" y="0"/>
+          <a:ext cx="0" cy="0"/>
+          <a:chOff x="0" y="0"/>
+          <a:chExt cx="0" cy="0"/>
+        </a:xfrm>
+      </p:grpSpPr>
+      <p:sp>
+        <p:nvSpPr>
+          <p:cNvPr id="2" name="Title 1"/>
+          <p:cNvSpPr>
+            <a:spLocks noGrp="1"/>
+          </p:cNvSpPr>
+          <p:nvPr>
+            <p:ph type="title"/>
+          </p:nvPr>
+        </p:nvSpPr>
+        <p:spPr/>
+        <p:txBody>
+          <a:bodyPr/>
+          <a:lstStyle/>
+          <a:p>
+            <a:r>
+              <a:rPr lang="en-US" dirty="0" smtClean="0"/>
+              <a:t>Decision tree</a:t>
+            </a:r>
+            <a:endParaRPr lang="en-US" dirty="0"/>
+          </a:p>
+        </p:txBody>
+      </p:sp>
+      <p:sp>
+        <p:nvSpPr>
+          <p:cNvPr id="3" name="Content Placeholder 2"/>
+          <p:cNvSpPr>
+            <a:spLocks noGrp="1"/>
+          </p:cNvSpPr>
+          <p:nvPr>
+            <p:ph sz="quarter" idx="13"/>
+          </p:nvPr>
+        </p:nvSpPr>
+        <p:spPr/>
+        <p:txBody>
+          <a:bodyPr/>
+          <a:lstStyle/>
+          <a:p>
+            <a:r>
+              <a:rPr lang="en-US" dirty="0" smtClean="0"/>
+              <a:t>Also used decision tree from </a:t>
+            </a:r>
+            <a:r>
+              <a:rPr lang="en-US" dirty="0" err="1" smtClean="0"/>
+              <a:t>sklearn</a:t>
+            </a:r>
+            <a:r>
+              <a:rPr lang="en-US" dirty="0" smtClean="0"/>
+              <a:t> library</a:t>
+            </a:r>
+          </a:p>
+          <a:p>
+            <a:r>
+              <a:rPr lang="en-US" dirty="0" smtClean="0"/>
+              <a:t>Got same result</a:t>
+            </a:r>
+            <a:endParaRPr lang="en-US" dirty="0"/>
+          </a:p>
+        </p:txBody>
+      </p:sp>
+      <p:pic>
+        <p:nvPicPr>
+          <p:cNvPr id="4" name="Picture 3"/>
+          <p:cNvPicPr>
+            <a:picLocks noChangeAspect="1"/>
+          </p:cNvPicPr>
+          <p:nvPr/>
+        </p:nvPicPr>
+        <p:blipFill>
+          <a:blip r:embed="rId2">
+            <a:extLst>
+              <a:ext uri="{28A0092B-C50C-407E-A947-70E740481C1C}">
+                <a14:useLocalDpi xmlns:a14="http://schemas.microsoft.com/office/drawing/2010/main" val="0"/>
+              </a:ext>
+            </a:extLst>
+          </a:blip>
+          <a:stretch>
+            <a:fillRect/>
+          </a:stretch>
+        </p:blipFill>
+        <p:spPr>
+          <a:xfrm>
+            <a:off x="2053234" y="3958916"/>
+            <a:ext cx="5259577" cy="1197143"/>
+          </a:xfrm>
+          <a:prstGeom prst="rect">
+            <a:avLst/>
+          </a:prstGeom>
+        </p:spPr>
+      </p:pic>
+    </p:spTree>
+    <p:extLst>
+      <p:ext uri="{BB962C8B-B14F-4D97-AF65-F5344CB8AC3E}">
+        <p14:creationId xmlns:p14="http://schemas.microsoft.com/office/powerpoint/2010/main" val="491253962"/>
+      </p:ext>
+    </p:extLst>
+  </p:cSld>
+  <p:clrMapOvr>
+    <a:masterClrMapping/>
+  </p:clrMapOvr>
+</p:sld>
+</file>
+
+<file path=ppt/slides/slide9.xml><?xml version="1.0" encoding="utf-8"?>
+<p:sld xmlns:a="http://schemas.openxmlformats.org/drawingml/2006/main" xmlns:r="http://schemas.openxmlformats.org/officeDocument/2006/relationships" xmlns:p="http://schemas.openxmlformats.org/presentationml/2006/main">
+  <p:cSld>
+    <p:bg>
+      <p:bgPr>
+        <a:solidFill>
+          <a:schemeClr val="accent4"/>
+        </a:solidFill>
+        <a:effectLst/>
+      </p:bgPr>
+    </p:bg>
+    <p:spTree>
+      <p:nvGrpSpPr>
+        <p:cNvPr id="1" name=""/>
+        <p:cNvGrpSpPr/>
+        <p:nvPr/>
+      </p:nvGrpSpPr>
+      <p:grpSpPr>
+        <a:xfrm>
+          <a:off x="0" y="0"/>
+          <a:ext cx="0" cy="0"/>
+          <a:chOff x="0" y="0"/>
+          <a:chExt cx="0" cy="0"/>
+        </a:xfrm>
+      </p:grpSpPr>
+      <p:sp>
+        <p:nvSpPr>
+          <p:cNvPr id="2" name="Title 1"/>
+          <p:cNvSpPr>
+            <a:spLocks noGrp="1"/>
+          </p:cNvSpPr>
+          <p:nvPr>
+            <p:ph type="title"/>
+          </p:nvPr>
+        </p:nvSpPr>
+        <p:spPr/>
+        <p:txBody>
+          <a:bodyPr>
+            <a:normAutofit fontScale="90000"/>
+          </a:bodyPr>
+          <a:lstStyle/>
+          <a:p>
+            <a:r>
+              <a:rPr lang="en-US" dirty="0" smtClean="0"/>
+              <a:t/>
+            </a:r>
+            <a:br>
+              <a:rPr lang="en-US" dirty="0" smtClean="0"/>
+            </a:br>
+            <a:r>
+              <a:rPr lang="en-US" dirty="0" smtClean="0"/>
+              <a:t>Predicted data from both logistic regression and decision tree</a:t>
+            </a:r>
+            <a:br>
+              <a:rPr lang="en-US" dirty="0" smtClean="0"/>
+            </a:br>
+            <a:endParaRPr lang="en-US" dirty="0"/>
+          </a:p>
+        </p:txBody>
+      </p:sp>
+      <p:pic>
+        <p:nvPicPr>
+          <p:cNvPr id="4" name="Content Placeholder 3"/>
+          <p:cNvPicPr>
+            <a:picLocks noGrp="1" noChangeAspect="1"/>
+          </p:cNvPicPr>
+          <p:nvPr>
+            <p:ph sz="quarter" idx="13"/>
+          </p:nvPr>
+        </p:nvPicPr>
+        <p:blipFill>
+          <a:blip r:embed="rId2">
+            <a:extLst>
+              <a:ext uri="{28A0092B-C50C-407E-A947-70E740481C1C}">
+                <a14:useLocalDpi xmlns:a14="http://schemas.microsoft.com/office/drawing/2010/main" val="0"/>
+              </a:ext>
+            </a:extLst>
+          </a:blip>
+          <a:stretch>
+            <a:fillRect/>
+          </a:stretch>
+        </p:blipFill>
+        <p:spPr>
+          <a:xfrm>
+            <a:off x="1831728" y="2366963"/>
+            <a:ext cx="5480544" cy="3424237"/>
+          </a:xfrm>
+        </p:spPr>
+      </p:pic>
+    </p:spTree>
+    <p:extLst>
+      <p:ext uri="{BB962C8B-B14F-4D97-AF65-F5344CB8AC3E}">
+        <p14:creationId xmlns:p14="http://schemas.microsoft.com/office/powerpoint/2010/main" val="1425229894"/>
       </p:ext>
     </p:extLst>
   </p:cSld>
@@ -7125,4 +8258,265 @@
     </a:ext>
   </a:extLst>
 </a:theme>
+</file>
+
+<file path=ppt/theme/theme2.xml><?xml version="1.0" encoding="utf-8"?>
+<a:theme xmlns:a="http://schemas.openxmlformats.org/drawingml/2006/main" name="Office Theme">
+  <a:themeElements>
+    <a:clrScheme name="Office">
+      <a:dk1>
+        <a:sysClr val="windowText" lastClr="000000"/>
+      </a:dk1>
+      <a:lt1>
+        <a:sysClr val="window" lastClr="FFFFFF"/>
+      </a:lt1>
+      <a:dk2>
+        <a:srgbClr val="44546A"/>
+      </a:dk2>
+      <a:lt2>
+        <a:srgbClr val="E7E6E6"/>
+      </a:lt2>
+      <a:accent1>
+        <a:srgbClr val="5B9BD5"/>
+      </a:accent1>
+      <a:accent2>
+        <a:srgbClr val="ED7D31"/>
+      </a:accent2>
+      <a:accent3>
+        <a:srgbClr val="A5A5A5"/>
+      </a:accent3>
+      <a:accent4>
+        <a:srgbClr val="FFC000"/>
+      </a:accent4>
+      <a:accent5>
+        <a:srgbClr val="4472C4"/>
+      </a:accent5>
+      <a:accent6>
+        <a:srgbClr val="70AD47"/>
+      </a:accent6>
+      <a:hlink>
+        <a:srgbClr val="0563C1"/>
+      </a:hlink>
+      <a:folHlink>
+        <a:srgbClr val="954F72"/>
+      </a:folHlink>
+    </a:clrScheme>
+    <a:fontScheme name="Office">
+      <a:majorFont>
+        <a:latin typeface="Calibri Light" panose="020F0302020204030204"/>
+        <a:ea typeface=""/>
+        <a:cs typeface=""/>
+        <a:font script="Jpan" typeface="ＭＳ Ｐゴシック"/>
+        <a:font script="Hang" typeface="맑은 고딕"/>
+        <a:font script="Hans" typeface="宋体"/>
+        <a:font script="Hant" typeface="新細明體"/>
+        <a:font script="Arab" typeface="Times New Roman"/>
+        <a:font script="Hebr" typeface="Times New Roman"/>
+        <a:font script="Thai" typeface="Angsana New"/>
+        <a:font script="Ethi" typeface="Nyala"/>
+        <a:font script="Beng" typeface="Vrinda"/>
+        <a:font script="Gujr" typeface="Shruti"/>
+        <a:font script="Khmr" typeface="MoolBoran"/>
+        <a:font script="Knda" typeface="Tunga"/>
+        <a:font script="Guru" typeface="Raavi"/>
+        <a:font script="Cans" typeface="Euphemia"/>
+        <a:font script="Cher" typeface="Plantagenet Cherokee"/>
+        <a:font script="Yiii" typeface="Microsoft Yi Baiti"/>
+        <a:font script="Tibt" typeface="Microsoft Himalaya"/>
+        <a:font script="Thaa" typeface="MV Boli"/>
+        <a:font script="Deva" typeface="Mangal"/>
+        <a:font script="Telu" typeface="Gautami"/>
+        <a:font script="Taml" typeface="Latha"/>
+        <a:font script="Syrc" typeface="Estrangelo Edessa"/>
+        <a:font script="Orya" typeface="Kalinga"/>
+        <a:font script="Mlym" typeface="Kartika"/>
+        <a:font script="Laoo" typeface="DokChampa"/>
+        <a:font script="Sinh" typeface="Iskoola Pota"/>
+        <a:font script="Mong" typeface="Mongolian Baiti"/>
+        <a:font script="Viet" typeface="Times New Roman"/>
+        <a:font script="Uigh" typeface="Microsoft Uighur"/>
+        <a:font script="Geor" typeface="Sylfaen"/>
+      </a:majorFont>
+      <a:minorFont>
+        <a:latin typeface="Calibri" panose="020F0502020204030204"/>
+        <a:ea typeface=""/>
+        <a:cs typeface=""/>
+        <a:font script="Jpan" typeface="ＭＳ Ｐゴシック"/>
+        <a:font script="Hang" typeface="맑은 고딕"/>
+        <a:font script="Hans" typeface="宋体"/>
+        <a:font script="Hant" typeface="新細明體"/>
+        <a:font script="Arab" typeface="Arial"/>
+        <a:font script="Hebr" typeface="Arial"/>
+        <a:font script="Thai" typeface="Cordia New"/>
+        <a:font script="Ethi" typeface="Nyala"/>
+        <a:font script="Beng" typeface="Vrinda"/>
+        <a:font script="Gujr" typeface="Shruti"/>
+        <a:font script="Khmr" typeface="DaunPenh"/>
+        <a:font script="Knda" typeface="Tunga"/>
+        <a:font script="Guru" typeface="Raavi"/>
+        <a:font script="Cans" typeface="Euphemia"/>
+        <a:font script="Cher" typeface="Plantagenet Cherokee"/>
+        <a:font script="Yiii" typeface="Microsoft Yi Baiti"/>
+        <a:font script="Tibt" typeface="Microsoft Himalaya"/>
+        <a:font script="Thaa" typeface="MV Boli"/>
+        <a:font script="Deva" typeface="Mangal"/>
+        <a:font script="Telu" typeface="Gautami"/>
+        <a:font script="Taml" typeface="Latha"/>
+        <a:font script="Syrc" typeface="Estrangelo Edessa"/>
+        <a:font script="Orya" typeface="Kalinga"/>
+        <a:font script="Mlym" typeface="Kartika"/>
+        <a:font script="Laoo" typeface="DokChampa"/>
+        <a:font script="Sinh" typeface="Iskoola Pota"/>
+        <a:font script="Mong" typeface="Mongolian Baiti"/>
+        <a:font script="Viet" typeface="Arial"/>
+        <a:font script="Uigh" typeface="Microsoft Uighur"/>
+        <a:font script="Geor" typeface="Sylfaen"/>
+      </a:minorFont>
+    </a:fontScheme>
+    <a:fmtScheme name="Office">
+      <a:fillStyleLst>
+        <a:solidFill>
+          <a:schemeClr val="phClr"/>
+        </a:solidFill>
+        <a:gradFill rotWithShape="1">
+          <a:gsLst>
+            <a:gs pos="0">
+              <a:schemeClr val="phClr">
+                <a:lumMod val="110000"/>
+                <a:satMod val="105000"/>
+                <a:tint val="67000"/>
+              </a:schemeClr>
+            </a:gs>
+            <a:gs pos="50000">
+              <a:schemeClr val="phClr">
+                <a:lumMod val="105000"/>
+                <a:satMod val="103000"/>
+                <a:tint val="73000"/>
+              </a:schemeClr>
+            </a:gs>
+            <a:gs pos="100000">
+              <a:schemeClr val="phClr">
+                <a:lumMod val="105000"/>
+                <a:satMod val="109000"/>
+                <a:tint val="81000"/>
+              </a:schemeClr>
+            </a:gs>
+          </a:gsLst>
+          <a:lin ang="5400000" scaled="0"/>
+        </a:gradFill>
+        <a:gradFill rotWithShape="1">
+          <a:gsLst>
+            <a:gs pos="0">
+              <a:schemeClr val="phClr">
+                <a:satMod val="103000"/>
+                <a:lumMod val="102000"/>
+                <a:tint val="94000"/>
+              </a:schemeClr>
+            </a:gs>
+            <a:gs pos="50000">
+              <a:schemeClr val="phClr">
+                <a:satMod val="110000"/>
+                <a:lumMod val="100000"/>
+                <a:shade val="100000"/>
+              </a:schemeClr>
+            </a:gs>
+            <a:gs pos="100000">
+              <a:schemeClr val="phClr">
+                <a:lumMod val="99000"/>
+                <a:satMod val="120000"/>
+                <a:shade val="78000"/>
+              </a:schemeClr>
+            </a:gs>
+          </a:gsLst>
+          <a:lin ang="5400000" scaled="0"/>
+        </a:gradFill>
+      </a:fillStyleLst>
+      <a:lnStyleLst>
+        <a:ln w="6350" cap="flat" cmpd="sng" algn="ctr">
+          <a:solidFill>
+            <a:schemeClr val="phClr"/>
+          </a:solidFill>
+          <a:prstDash val="solid"/>
+          <a:miter lim="800000"/>
+        </a:ln>
+        <a:ln w="12700" cap="flat" cmpd="sng" algn="ctr">
+          <a:solidFill>
+            <a:schemeClr val="phClr"/>
+          </a:solidFill>
+          <a:prstDash val="solid"/>
+          <a:miter lim="800000"/>
+        </a:ln>
+        <a:ln w="19050" cap="flat" cmpd="sng" algn="ctr">
+          <a:solidFill>
+            <a:schemeClr val="phClr"/>
+          </a:solidFill>
+          <a:prstDash val="solid"/>
+          <a:miter lim="800000"/>
+        </a:ln>
+      </a:lnStyleLst>
+      <a:effectStyleLst>
+        <a:effectStyle>
+          <a:effectLst/>
+        </a:effectStyle>
+        <a:effectStyle>
+          <a:effectLst/>
+        </a:effectStyle>
+        <a:effectStyle>
+          <a:effectLst>
+            <a:outerShdw blurRad="57150" dist="19050" dir="5400000" algn="ctr" rotWithShape="0">
+              <a:srgbClr val="000000">
+                <a:alpha val="63000"/>
+              </a:srgbClr>
+            </a:outerShdw>
+          </a:effectLst>
+        </a:effectStyle>
+      </a:effectStyleLst>
+      <a:bgFillStyleLst>
+        <a:solidFill>
+          <a:schemeClr val="phClr"/>
+        </a:solidFill>
+        <a:solidFill>
+          <a:schemeClr val="phClr">
+            <a:tint val="95000"/>
+            <a:satMod val="170000"/>
+          </a:schemeClr>
+        </a:solidFill>
+        <a:gradFill rotWithShape="1">
+          <a:gsLst>
+            <a:gs pos="0">
+              <a:schemeClr val="phClr">
+                <a:tint val="93000"/>
+                <a:satMod val="150000"/>
+                <a:shade val="98000"/>
+                <a:lumMod val="102000"/>
+              </a:schemeClr>
+            </a:gs>
+            <a:gs pos="50000">
+              <a:schemeClr val="phClr">
+                <a:tint val="98000"/>
+                <a:satMod val="130000"/>
+                <a:shade val="90000"/>
+                <a:lumMod val="103000"/>
+              </a:schemeClr>
+            </a:gs>
+            <a:gs pos="100000">
+              <a:schemeClr val="phClr">
+                <a:shade val="63000"/>
+                <a:satMod val="120000"/>
+              </a:schemeClr>
+            </a:gs>
+          </a:gsLst>
+          <a:lin ang="5400000" scaled="0"/>
+        </a:gradFill>
+      </a:bgFillStyleLst>
+    </a:fmtScheme>
+  </a:themeElements>
+  <a:objectDefaults/>
+  <a:extraClrSchemeLst/>
+  <a:extLst>
+    <a:ext uri="{05A4C25C-085E-4340-85A3-A5531E510DB2}">
+      <thm15:themeFamily xmlns:thm15="http://schemas.microsoft.com/office/thememl/2012/main" name="Office Theme" id="{62F939B6-93AF-4DB8-9C6B-D6C7DFDC589F}" vid="{4A3C46E8-61CC-4603-A589-7422A47A8E4A}"/>
+    </a:ext>
+  </a:extLst>
+</a:theme>
 </file>
</xml_diff>